<commit_message>
made the template match the master slide deck with colors and formats. removed placeholder logos
</commit_message>
<xml_diff>
--- a/Development-Training_Name/4-Implement/Lesson_Plans-POI_NAME/Lesson_Plan01-NAME/Audio_Visual-Template/Lesson_Slide-LESSON_NAME.pptx
+++ b/Development-Training_Name/4-Implement/Lesson_Plans-POI_NAME/Lesson_Plan01-NAME/Audio_Visual-Template/Lesson_Slide-LESSON_NAME.pptx
@@ -6,13 +6,16 @@
     <p:sldMasterId id="2147483675" r:id="rId2"/>
   </p:sldMasterIdLst>
   <p:notesMasterIdLst>
-    <p:notesMasterId r:id="rId7"/>
+    <p:notesMasterId r:id="rId10"/>
   </p:notesMasterIdLst>
   <p:sldIdLst>
-    <p:sldId id="381" r:id="rId3"/>
-    <p:sldId id="383" r:id="rId4"/>
-    <p:sldId id="619" r:id="rId5"/>
-    <p:sldId id="377" r:id="rId6"/>
+    <p:sldId id="620" r:id="rId3"/>
+    <p:sldId id="621" r:id="rId4"/>
+    <p:sldId id="383" r:id="rId5"/>
+    <p:sldId id="269" r:id="rId6"/>
+    <p:sldId id="270" r:id="rId7"/>
+    <p:sldId id="271" r:id="rId8"/>
+    <p:sldId id="272" r:id="rId9"/>
   </p:sldIdLst>
   <p:sldSz cx="12192000" cy="6858000"/>
   <p:notesSz cx="6858000" cy="9144000"/>
@@ -541,6 +544,236 @@
 </p:notesMaster>
 </file>
 
+<file path=ppt/notesSlides/notesSlide1.xml><?xml version="1.0" encoding="utf-8"?>
+<p:notes xmlns:a="http://schemas.openxmlformats.org/drawingml/2006/main" xmlns:r="http://schemas.openxmlformats.org/officeDocument/2006/relationships" xmlns:p="http://schemas.openxmlformats.org/presentationml/2006/main">
+  <p:cSld>
+    <p:spTree>
+      <p:nvGrpSpPr>
+        <p:cNvPr id="1" name=""/>
+        <p:cNvGrpSpPr/>
+        <p:nvPr/>
+      </p:nvGrpSpPr>
+      <p:grpSpPr>
+        <a:xfrm>
+          <a:off x="0" y="0"/>
+          <a:ext cx="0" cy="0"/>
+          <a:chOff x="0" y="0"/>
+          <a:chExt cx="0" cy="0"/>
+        </a:xfrm>
+      </p:grpSpPr>
+      <p:sp>
+        <p:nvSpPr>
+          <p:cNvPr id="2" name="Slide Image Placeholder 1"/>
+          <p:cNvSpPr>
+            <a:spLocks noGrp="1" noRot="1" noChangeAspect="1"/>
+          </p:cNvSpPr>
+          <p:nvPr>
+            <p:ph type="sldImg"/>
+          </p:nvPr>
+        </p:nvSpPr>
+        <p:spPr>
+          <a:xfrm>
+            <a:off x="382588" y="695325"/>
+            <a:ext cx="6092825" cy="3427413"/>
+          </a:xfrm>
+        </p:spPr>
+      </p:sp>
+      <p:sp>
+        <p:nvSpPr>
+          <p:cNvPr id="3" name="Notes Placeholder 2"/>
+          <p:cNvSpPr>
+            <a:spLocks noGrp="1"/>
+          </p:cNvSpPr>
+          <p:nvPr>
+            <p:ph type="body" idx="1"/>
+          </p:nvPr>
+        </p:nvSpPr>
+        <p:spPr/>
+        <p:txBody>
+          <a:bodyPr/>
+          <a:lstStyle/>
+          <a:p>
+            <a:r>
+              <a:rPr lang="en-US" dirty="0"/>
+              <a:t>Start by creating a slide master that is in English. As needed duplicate and translate slides into target language. Color English slides in Yellow and target language slides in white. </a:t>
+            </a:r>
+            <a:br>
+              <a:rPr lang="en-US" dirty="0"/>
+            </a:br>
+            <a:br>
+              <a:rPr lang="en-US" dirty="0"/>
+            </a:br>
+            <a:r>
+              <a:rPr lang="en-US" dirty="0"/>
+              <a:t>The example below uses Spanish as a theoretical target language. </a:t>
+            </a:r>
+          </a:p>
+        </p:txBody>
+      </p:sp>
+      <p:sp>
+        <p:nvSpPr>
+          <p:cNvPr id="4" name="Slide Number Placeholder 3"/>
+          <p:cNvSpPr>
+            <a:spLocks noGrp="1"/>
+          </p:cNvSpPr>
+          <p:nvPr>
+            <p:ph type="sldNum" idx="8"/>
+          </p:nvPr>
+        </p:nvSpPr>
+        <p:spPr/>
+        <p:txBody>
+          <a:bodyPr/>
+          <a:lstStyle/>
+          <a:p>
+            <a:pPr indent="0" algn="r">
+              <a:buNone/>
+            </a:pPr>
+            <a:fld id="{96D071C0-0F6A-4E5C-B3E5-B824FE66220F}" type="slidenum">
+              <a:rPr lang="en-US" sz="1400" b="0" strike="noStrike" spc="-1" smtClean="0">
+                <a:solidFill>
+                  <a:srgbClr val="000000"/>
+                </a:solidFill>
+                <a:latin typeface="Times New Roman"/>
+              </a:rPr>
+              <a:t>1</a:t>
+            </a:fld>
+            <a:endParaRPr lang="en-US" sz="1400" b="0" strike="noStrike" spc="-1">
+              <a:solidFill>
+                <a:srgbClr val="000000"/>
+              </a:solidFill>
+              <a:latin typeface="Times New Roman"/>
+            </a:endParaRPr>
+          </a:p>
+        </p:txBody>
+      </p:sp>
+    </p:spTree>
+    <p:extLst>
+      <p:ext uri="{BB962C8B-B14F-4D97-AF65-F5344CB8AC3E}">
+        <p14:creationId xmlns:p14="http://schemas.microsoft.com/office/powerpoint/2010/main" val="1278001126"/>
+      </p:ext>
+    </p:extLst>
+  </p:cSld>
+  <p:clrMapOvr>
+    <a:masterClrMapping/>
+  </p:clrMapOvr>
+</p:notes>
+</file>
+
+<file path=ppt/notesSlides/notesSlide2.xml><?xml version="1.0" encoding="utf-8"?>
+<p:notes xmlns:a="http://schemas.openxmlformats.org/drawingml/2006/main" xmlns:r="http://schemas.openxmlformats.org/officeDocument/2006/relationships" xmlns:p="http://schemas.openxmlformats.org/presentationml/2006/main">
+  <p:cSld>
+    <p:spTree>
+      <p:nvGrpSpPr>
+        <p:cNvPr id="1" name=""/>
+        <p:cNvGrpSpPr/>
+        <p:nvPr/>
+      </p:nvGrpSpPr>
+      <p:grpSpPr>
+        <a:xfrm>
+          <a:off x="0" y="0"/>
+          <a:ext cx="0" cy="0"/>
+          <a:chOff x="0" y="0"/>
+          <a:chExt cx="0" cy="0"/>
+        </a:xfrm>
+      </p:grpSpPr>
+      <p:sp>
+        <p:nvSpPr>
+          <p:cNvPr id="2" name="Slide Image Placeholder 1"/>
+          <p:cNvSpPr>
+            <a:spLocks noGrp="1" noRot="1" noChangeAspect="1"/>
+          </p:cNvSpPr>
+          <p:nvPr>
+            <p:ph type="sldImg"/>
+          </p:nvPr>
+        </p:nvSpPr>
+        <p:spPr>
+          <a:xfrm>
+            <a:off x="382588" y="695325"/>
+            <a:ext cx="6092825" cy="3427413"/>
+          </a:xfrm>
+        </p:spPr>
+      </p:sp>
+      <p:sp>
+        <p:nvSpPr>
+          <p:cNvPr id="3" name="Notes Placeholder 2"/>
+          <p:cNvSpPr>
+            <a:spLocks noGrp="1"/>
+          </p:cNvSpPr>
+          <p:nvPr>
+            <p:ph type="body" idx="1"/>
+          </p:nvPr>
+        </p:nvSpPr>
+        <p:spPr/>
+        <p:txBody>
+          <a:bodyPr/>
+          <a:lstStyle/>
+          <a:p>
+            <a:r>
+              <a:rPr lang="en-US" dirty="0"/>
+              <a:t>Start by creating a slide master that is in English. As needed duplicate and translate slides into target language. Color English slides in Yellow and target language slides in white. </a:t>
+            </a:r>
+            <a:br>
+              <a:rPr lang="en-US" dirty="0"/>
+            </a:br>
+            <a:br>
+              <a:rPr lang="en-US" dirty="0"/>
+            </a:br>
+            <a:r>
+              <a:rPr lang="en-US" dirty="0"/>
+              <a:t>The example below uses Spanish as a theoretical target language. </a:t>
+            </a:r>
+          </a:p>
+        </p:txBody>
+      </p:sp>
+      <p:sp>
+        <p:nvSpPr>
+          <p:cNvPr id="4" name="Slide Number Placeholder 3"/>
+          <p:cNvSpPr>
+            <a:spLocks noGrp="1"/>
+          </p:cNvSpPr>
+          <p:nvPr>
+            <p:ph type="sldNum" idx="8"/>
+          </p:nvPr>
+        </p:nvSpPr>
+        <p:spPr/>
+        <p:txBody>
+          <a:bodyPr/>
+          <a:lstStyle/>
+          <a:p>
+            <a:pPr indent="0" algn="r">
+              <a:buNone/>
+            </a:pPr>
+            <a:fld id="{96D071C0-0F6A-4E5C-B3E5-B824FE66220F}" type="slidenum">
+              <a:rPr lang="en-US" sz="1400" b="0" strike="noStrike" spc="-1" smtClean="0">
+                <a:solidFill>
+                  <a:srgbClr val="000000"/>
+                </a:solidFill>
+                <a:latin typeface="Times New Roman"/>
+              </a:rPr>
+              <a:t>2</a:t>
+            </a:fld>
+            <a:endParaRPr lang="en-US" sz="1400" b="0" strike="noStrike" spc="-1">
+              <a:solidFill>
+                <a:srgbClr val="000000"/>
+              </a:solidFill>
+              <a:latin typeface="Times New Roman"/>
+            </a:endParaRPr>
+          </a:p>
+        </p:txBody>
+      </p:sp>
+    </p:spTree>
+    <p:extLst>
+      <p:ext uri="{BB962C8B-B14F-4D97-AF65-F5344CB8AC3E}">
+        <p14:creationId xmlns:p14="http://schemas.microsoft.com/office/powerpoint/2010/main" val="2282271852"/>
+      </p:ext>
+    </p:extLst>
+  </p:cSld>
+  <p:clrMapOvr>
+    <a:masterClrMapping/>
+  </p:clrMapOvr>
+</p:notes>
+</file>
+
 <file path=ppt/slideLayouts/slideLayout1.xml><?xml version="1.0" encoding="utf-8"?>
 <p:sldLayout xmlns:a="http://schemas.openxmlformats.org/drawingml/2006/main" xmlns:r="http://schemas.openxmlformats.org/officeDocument/2006/relationships" xmlns:p="http://schemas.openxmlformats.org/presentationml/2006/main" type="title" preserve="1">
   <p:cSld name="Title Slide">
@@ -688,7 +921,7 @@
           <a:p>
             <a:fld id="{19E3F066-8095-7A47-8BBF-FB45577C0028}" type="datetimeFigureOut">
               <a:rPr lang="en-US" smtClean="0"/>
-              <a:t>11/29/22</a:t>
+              <a:t>6/19/24</a:t>
             </a:fld>
             <a:endParaRPr lang="en-US"/>
           </a:p>
@@ -886,7 +1119,7 @@
           <a:p>
             <a:fld id="{19E3F066-8095-7A47-8BBF-FB45577C0028}" type="datetimeFigureOut">
               <a:rPr lang="en-US" smtClean="0"/>
-              <a:t>11/29/22</a:t>
+              <a:t>6/19/24</a:t>
             </a:fld>
             <a:endParaRPr lang="en-US"/>
           </a:p>
@@ -1094,7 +1327,7 @@
           <a:p>
             <a:fld id="{19E3F066-8095-7A47-8BBF-FB45577C0028}" type="datetimeFigureOut">
               <a:rPr lang="en-US" smtClean="0"/>
-              <a:t>11/29/22</a:t>
+              <a:t>6/19/24</a:t>
             </a:fld>
             <a:endParaRPr lang="en-US"/>
           </a:p>
@@ -1168,7 +1401,146 @@
 </file>
 
 <file path=ppt/slideLayouts/slideLayout12.xml><?xml version="1.0" encoding="utf-8"?>
-<p:sldLayout xmlns:a="http://schemas.openxmlformats.org/drawingml/2006/main" xmlns:r="http://schemas.openxmlformats.org/officeDocument/2006/relationships" xmlns:p="http://schemas.openxmlformats.org/presentationml/2006/main" userDrawn="1">
+<p:sldLayout xmlns:a="http://schemas.openxmlformats.org/drawingml/2006/main" xmlns:r="http://schemas.openxmlformats.org/officeDocument/2006/relationships" xmlns:p="http://schemas.openxmlformats.org/presentationml/2006/main" type="tx">
+  <p:cSld name="Title, Content">
+    <p:spTree>
+      <p:nvGrpSpPr>
+        <p:cNvPr id="1" name=""/>
+        <p:cNvGrpSpPr/>
+        <p:nvPr/>
+      </p:nvGrpSpPr>
+      <p:grpSpPr>
+        <a:xfrm>
+          <a:off x="0" y="0"/>
+          <a:ext cx="0" cy="0"/>
+          <a:chOff x="0" y="0"/>
+          <a:chExt cx="0" cy="0"/>
+        </a:xfrm>
+      </p:grpSpPr>
+      <p:sp>
+        <p:nvSpPr>
+          <p:cNvPr id="99" name="Body Level One…"/>
+          <p:cNvSpPr txBox="1">
+            <a:spLocks noGrp="1"/>
+          </p:cNvSpPr>
+          <p:nvPr>
+            <p:ph type="body" idx="1"/>
+          </p:nvPr>
+        </p:nvSpPr>
+        <p:spPr>
+          <a:xfrm>
+            <a:off x="609479" y="1604519"/>
+            <a:ext cx="10972442" cy="3977282"/>
+          </a:xfrm>
+          <a:prstGeom prst="rect">
+            <a:avLst/>
+          </a:prstGeom>
+        </p:spPr>
+        <p:txBody>
+          <a:bodyPr lIns="0" tIns="0" rIns="0" bIns="0"/>
+          <a:lstStyle/>
+          <a:p>
+            <a:r>
+              <a:t>Body Level One</a:t>
+            </a:r>
+          </a:p>
+          <a:p>
+            <a:pPr lvl="1"/>
+            <a:r>
+              <a:t>Body Level Two</a:t>
+            </a:r>
+          </a:p>
+          <a:p>
+            <a:pPr lvl="2"/>
+            <a:r>
+              <a:t>Body Level Three</a:t>
+            </a:r>
+          </a:p>
+          <a:p>
+            <a:pPr lvl="3"/>
+            <a:r>
+              <a:t>Body Level Four</a:t>
+            </a:r>
+          </a:p>
+          <a:p>
+            <a:pPr lvl="4"/>
+            <a:r>
+              <a:t>Body Level Five</a:t>
+            </a:r>
+          </a:p>
+        </p:txBody>
+      </p:sp>
+      <p:sp>
+        <p:nvSpPr>
+          <p:cNvPr id="100" name="Title Text"/>
+          <p:cNvSpPr txBox="1">
+            <a:spLocks noGrp="1"/>
+          </p:cNvSpPr>
+          <p:nvPr>
+            <p:ph type="title"/>
+          </p:nvPr>
+        </p:nvSpPr>
+        <p:spPr>
+          <a:prstGeom prst="rect">
+            <a:avLst/>
+          </a:prstGeom>
+        </p:spPr>
+        <p:txBody>
+          <a:bodyPr/>
+          <a:lstStyle>
+            <a:lvl1pPr>
+              <a:defRPr sz="3800"/>
+            </a:lvl1pPr>
+          </a:lstStyle>
+          <a:p>
+            <a:r>
+              <a:t>Title Text</a:t>
+            </a:r>
+          </a:p>
+        </p:txBody>
+      </p:sp>
+      <p:sp>
+        <p:nvSpPr>
+          <p:cNvPr id="101" name="Slide Number"/>
+          <p:cNvSpPr txBox="1">
+            <a:spLocks noGrp="1"/>
+          </p:cNvSpPr>
+          <p:nvPr>
+            <p:ph type="sldNum" sz="quarter" idx="2"/>
+          </p:nvPr>
+        </p:nvSpPr>
+        <p:spPr>
+          <a:prstGeom prst="rect">
+            <a:avLst/>
+          </a:prstGeom>
+        </p:spPr>
+        <p:txBody>
+          <a:bodyPr/>
+          <a:lstStyle/>
+          <a:p>
+            <a:fld id="{86CB4B4D-7CA3-9044-876B-883B54F8677D}" type="slidenum">
+              <a:t>‹#›</a:t>
+            </a:fld>
+            <a:endParaRPr/>
+          </a:p>
+        </p:txBody>
+      </p:sp>
+    </p:spTree>
+    <p:extLst>
+      <p:ext uri="{BB962C8B-B14F-4D97-AF65-F5344CB8AC3E}">
+        <p14:creationId xmlns:p14="http://schemas.microsoft.com/office/powerpoint/2010/main" val="1467156308"/>
+      </p:ext>
+    </p:extLst>
+  </p:cSld>
+  <p:clrMapOvr>
+    <a:masterClrMapping/>
+  </p:clrMapOvr>
+  <p:transition spd="med"/>
+</p:sldLayout>
+</file>
+
+<file path=ppt/slideLayouts/slideLayout13.xml><?xml version="1.0" encoding="utf-8"?>
+<p:sldLayout xmlns:a="http://schemas.openxmlformats.org/drawingml/2006/main" xmlns:r="http://schemas.openxmlformats.org/officeDocument/2006/relationships" xmlns:p="http://schemas.openxmlformats.org/presentationml/2006/main" type="tx">
   <p:cSld name="Custom Layout">
     <p:spTree>
       <p:nvGrpSpPr>
@@ -1186,232 +1558,41 @@
       </p:grpSpPr>
       <p:sp>
         <p:nvSpPr>
-          <p:cNvPr id="3" name="Date Placeholder 2">
-            <a:extLst>
-              <a:ext uri="{FF2B5EF4-FFF2-40B4-BE49-F238E27FC236}">
-                <a16:creationId xmlns:a16="http://schemas.microsoft.com/office/drawing/2014/main" id="{D920545E-15F6-B470-A814-7BCEBD3C6EA7}"/>
-              </a:ext>
-            </a:extLst>
-          </p:cNvPr>
-          <p:cNvSpPr>
-            <a:spLocks noGrp="1"/>
-          </p:cNvSpPr>
-          <p:nvPr>
-            <p:ph type="dt" sz="half" idx="10"/>
-          </p:nvPr>
-        </p:nvSpPr>
-        <p:spPr/>
+          <p:cNvPr id="92" name="Slide Number"/>
+          <p:cNvSpPr txBox="1">
+            <a:spLocks noGrp="1"/>
+          </p:cNvSpPr>
+          <p:nvPr>
+            <p:ph type="sldNum" sz="quarter" idx="2"/>
+          </p:nvPr>
+        </p:nvSpPr>
+        <p:spPr>
+          <a:prstGeom prst="rect">
+            <a:avLst/>
+          </a:prstGeom>
+        </p:spPr>
         <p:txBody>
           <a:bodyPr/>
           <a:lstStyle/>
           <a:p>
-            <a:fld id="{D22EE3CE-13A9-674D-B3E7-8F60B492096B}" type="datetimeFigureOut">
-              <a:rPr lang="en-US" smtClean="0"/>
-              <a:t>11/29/22</a:t>
-            </a:fld>
-            <a:endParaRPr lang="en-US"/>
-          </a:p>
-        </p:txBody>
-      </p:sp>
-      <p:sp>
-        <p:nvSpPr>
-          <p:cNvPr id="4" name="Footer Placeholder 3">
-            <a:extLst>
-              <a:ext uri="{FF2B5EF4-FFF2-40B4-BE49-F238E27FC236}">
-                <a16:creationId xmlns:a16="http://schemas.microsoft.com/office/drawing/2014/main" id="{42E62649-07F8-D840-FA56-828B5C57A7DE}"/>
-              </a:ext>
-            </a:extLst>
-          </p:cNvPr>
-          <p:cNvSpPr>
-            <a:spLocks noGrp="1"/>
-          </p:cNvSpPr>
-          <p:nvPr>
-            <p:ph type="ftr" sz="quarter" idx="11"/>
-          </p:nvPr>
-        </p:nvSpPr>
-        <p:spPr/>
-        <p:txBody>
-          <a:bodyPr/>
-          <a:lstStyle/>
-          <a:p>
-            <a:endParaRPr lang="en-US"/>
-          </a:p>
-        </p:txBody>
-      </p:sp>
-      <p:sp>
-        <p:nvSpPr>
-          <p:cNvPr id="5" name="Slide Number Placeholder 4">
-            <a:extLst>
-              <a:ext uri="{FF2B5EF4-FFF2-40B4-BE49-F238E27FC236}">
-                <a16:creationId xmlns:a16="http://schemas.microsoft.com/office/drawing/2014/main" id="{CF1BE7ED-0344-E171-1F8B-122276FD66A3}"/>
-              </a:ext>
-            </a:extLst>
-          </p:cNvPr>
-          <p:cNvSpPr>
-            <a:spLocks noGrp="1"/>
-          </p:cNvSpPr>
-          <p:nvPr>
-            <p:ph type="sldNum" sz="quarter" idx="12"/>
-          </p:nvPr>
-        </p:nvSpPr>
-        <p:spPr/>
-        <p:txBody>
-          <a:bodyPr/>
-          <a:lstStyle/>
-          <a:p>
-            <a:fld id="{4006B354-493D-154F-8DC8-7675D268A9F2}" type="slidenum">
-              <a:rPr lang="en-US" smtClean="0"/>
+            <a:fld id="{86CB4B4D-7CA3-9044-876B-883B54F8677D}" type="slidenum">
               <a:t>‹#›</a:t>
             </a:fld>
-            <a:endParaRPr lang="en-US"/>
+            <a:endParaRPr/>
           </a:p>
         </p:txBody>
       </p:sp>
     </p:spTree>
     <p:extLst>
       <p:ext uri="{BB962C8B-B14F-4D97-AF65-F5344CB8AC3E}">
-        <p14:creationId xmlns:p14="http://schemas.microsoft.com/office/powerpoint/2010/main" val="2299448291"/>
+        <p14:creationId xmlns:p14="http://schemas.microsoft.com/office/powerpoint/2010/main" val="3501166409"/>
       </p:ext>
     </p:extLst>
   </p:cSld>
   <p:clrMapOvr>
     <a:masterClrMapping/>
   </p:clrMapOvr>
-</p:sldLayout>
-</file>
-
-<file path=ppt/slideLayouts/slideLayout13.xml><?xml version="1.0" encoding="utf-8"?>
-<p:sldLayout xmlns:a="http://schemas.openxmlformats.org/drawingml/2006/main" xmlns:r="http://schemas.openxmlformats.org/officeDocument/2006/relationships" xmlns:p="http://schemas.openxmlformats.org/presentationml/2006/main" userDrawn="1">
-  <p:cSld name="Title, Content">
-    <p:spTree>
-      <p:nvGrpSpPr>
-        <p:cNvPr id="1" name=""/>
-        <p:cNvGrpSpPr/>
-        <p:nvPr/>
-      </p:nvGrpSpPr>
-      <p:grpSpPr>
-        <a:xfrm>
-          <a:off x="0" y="0"/>
-          <a:ext cx="0" cy="0"/>
-          <a:chOff x="0" y="0"/>
-          <a:chExt cx="0" cy="0"/>
-        </a:xfrm>
-      </p:grpSpPr>
-      <p:sp>
-        <p:nvSpPr>
-          <p:cNvPr id="107" name="PlaceHolder 2"/>
-          <p:cNvSpPr>
-            <a:spLocks noGrp="1"/>
-          </p:cNvSpPr>
-          <p:nvPr>
-            <p:ph/>
-          </p:nvPr>
-        </p:nvSpPr>
-        <p:spPr>
-          <a:xfrm>
-            <a:off x="609480" y="1604520"/>
-            <a:ext cx="10972440" cy="3977280"/>
-          </a:xfrm>
-          <a:prstGeom prst="rect">
-            <a:avLst/>
-          </a:prstGeom>
-          <a:noFill/>
-          <a:ln w="0">
-            <a:noFill/>
-          </a:ln>
-        </p:spPr>
-        <p:txBody>
-          <a:bodyPr lIns="0" tIns="0" rIns="0" bIns="0" anchor="t">
-            <a:normAutofit/>
-          </a:bodyPr>
-          <a:lstStyle/>
-          <a:p>
-            <a:pPr>
-              <a:lnSpc>
-                <a:spcPct val="93000"/>
-              </a:lnSpc>
-              <a:spcBef>
-                <a:spcPts val="1417"/>
-              </a:spcBef>
-              <a:buNone/>
-            </a:pPr>
-            <a:endParaRPr lang="en-US" sz="3200" b="0" strike="noStrike" spc="-1">
-              <a:solidFill>
-                <a:srgbClr val="000000"/>
-              </a:solidFill>
-              <a:latin typeface="Arial"/>
-            </a:endParaRPr>
-          </a:p>
-        </p:txBody>
-      </p:sp>
-      <p:sp>
-        <p:nvSpPr>
-          <p:cNvPr id="4" name="PlaceHolder 3"/>
-          <p:cNvSpPr>
-            <a:spLocks noGrp="1"/>
-          </p:cNvSpPr>
-          <p:nvPr>
-            <p:ph type="sldNum" idx="2"/>
-          </p:nvPr>
-        </p:nvSpPr>
-        <p:spPr/>
-        <p:txBody>
-          <a:bodyPr/>
-          <a:lstStyle/>
-          <a:p>
-            <a:fld id="{DD075454-311C-4D4F-B5E5-C906898B1750}" type="slidenum">
-              <a:t>‹#›</a:t>
-            </a:fld>
-            <a:endParaRPr/>
-          </a:p>
-        </p:txBody>
-      </p:sp>
-      <p:sp>
-        <p:nvSpPr>
-          <p:cNvPr id="6" name="Title 5">
-            <a:extLst>
-              <a:ext uri="{FF2B5EF4-FFF2-40B4-BE49-F238E27FC236}">
-                <a16:creationId xmlns:a16="http://schemas.microsoft.com/office/drawing/2014/main" id="{88B2C156-1D50-25CA-8EFB-B1EAB833CB9C}"/>
-              </a:ext>
-            </a:extLst>
-          </p:cNvPr>
-          <p:cNvSpPr>
-            <a:spLocks noGrp="1"/>
-          </p:cNvSpPr>
-          <p:nvPr>
-            <p:ph type="title"/>
-          </p:nvPr>
-        </p:nvSpPr>
-        <p:spPr/>
-        <p:txBody>
-          <a:bodyPr>
-            <a:normAutofit/>
-          </a:bodyPr>
-          <a:lstStyle>
-            <a:lvl1pPr marL="0" indent="0">
-              <a:buFont typeface="Arial" panose="020B0604020202020204" pitchFamily="34" charset="0"/>
-              <a:buNone/>
-              <a:defRPr sz="3800"/>
-            </a:lvl1pPr>
-          </a:lstStyle>
-          <a:p>
-            <a:r>
-              <a:rPr lang="en-US" dirty="0"/>
-              <a:t>Click to edit Master title style</a:t>
-            </a:r>
-          </a:p>
-        </p:txBody>
-      </p:sp>
-    </p:spTree>
-    <p:extLst>
-      <p:ext uri="{BB962C8B-B14F-4D97-AF65-F5344CB8AC3E}">
-        <p14:creationId xmlns:p14="http://schemas.microsoft.com/office/powerpoint/2010/main" val="2374531096"/>
-      </p:ext>
-    </p:extLst>
-  </p:cSld>
-  <p:clrMapOvr>
-    <a:masterClrMapping/>
-  </p:clrMapOvr>
+  <p:transition spd="med"/>
 </p:sldLayout>
 </file>
 
@@ -1462,55 +1643,26 @@
           <a:chExt cx="0" cy="0"/>
         </a:xfrm>
       </p:grpSpPr>
-      <p:pic>
-        <p:nvPicPr>
-          <p:cNvPr id="2" name="4DF-LOGO.png" descr="4DF-LOGO.png">
-            <a:extLst>
-              <a:ext uri="{FF2B5EF4-FFF2-40B4-BE49-F238E27FC236}">
-                <a16:creationId xmlns:a16="http://schemas.microsoft.com/office/drawing/2014/main" id="{C3B271E5-B70C-182B-E535-C58E4DF3169C}"/>
-              </a:ext>
-            </a:extLst>
-          </p:cNvPr>
-          <p:cNvPicPr/>
-          <p:nvPr userDrawn="1"/>
-        </p:nvPicPr>
-        <p:blipFill>
-          <a:blip r:embed="rId2"/>
-          <a:stretch/>
-        </p:blipFill>
+      <p:sp>
+        <p:nvSpPr>
+          <p:cNvPr id="3" name="PlaceHolder 2">
+            <a:extLst>
+              <a:ext uri="{FF2B5EF4-FFF2-40B4-BE49-F238E27FC236}">
+                <a16:creationId xmlns:a16="http://schemas.microsoft.com/office/drawing/2014/main" id="{790EC06F-46E0-0D58-4347-2E509D63E25A}"/>
+              </a:ext>
+            </a:extLst>
+          </p:cNvPr>
+          <p:cNvSpPr>
+            <a:spLocks noGrp="1"/>
+          </p:cNvSpPr>
+          <p:nvPr>
+            <p:ph/>
+          </p:nvPr>
+        </p:nvSpPr>
         <p:spPr>
           <a:xfrm>
-            <a:off x="50760" y="1641960"/>
-            <a:ext cx="4494240" cy="4334040"/>
-          </a:xfrm>
-          <a:prstGeom prst="rect">
-            <a:avLst/>
-          </a:prstGeom>
-          <a:ln w="12600">
-            <a:noFill/>
-          </a:ln>
-        </p:spPr>
-      </p:pic>
-      <p:sp>
-        <p:nvSpPr>
-          <p:cNvPr id="3" name="PlaceHolder 2">
-            <a:extLst>
-              <a:ext uri="{FF2B5EF4-FFF2-40B4-BE49-F238E27FC236}">
-                <a16:creationId xmlns:a16="http://schemas.microsoft.com/office/drawing/2014/main" id="{790EC06F-46E0-0D58-4347-2E509D63E25A}"/>
-              </a:ext>
-            </a:extLst>
-          </p:cNvPr>
-          <p:cNvSpPr>
-            <a:spLocks noGrp="1"/>
-          </p:cNvSpPr>
-          <p:nvPr>
-            <p:ph/>
-          </p:nvPr>
-        </p:nvSpPr>
-        <p:spPr>
-          <a:xfrm>
-            <a:off x="3296672" y="2950685"/>
-            <a:ext cx="8533378" cy="2704116"/>
+            <a:off x="375127" y="2963211"/>
+            <a:ext cx="11441743" cy="1873119"/>
           </a:xfrm>
           <a:prstGeom prst="rect">
             <a:avLst/>
@@ -1825,7 +1977,7 @@
           <a:p>
             <a:fld id="{19E3F066-8095-7A47-8BBF-FB45577C0028}" type="datetimeFigureOut">
               <a:rPr lang="en-US" smtClean="0"/>
-              <a:t>11/29/22</a:t>
+              <a:t>6/19/24</a:t>
             </a:fld>
             <a:endParaRPr lang="en-US"/>
           </a:p>
@@ -2100,7 +2252,7 @@
           <a:p>
             <a:fld id="{19E3F066-8095-7A47-8BBF-FB45577C0028}" type="datetimeFigureOut">
               <a:rPr lang="en-US" smtClean="0"/>
-              <a:t>11/29/22</a:t>
+              <a:t>6/19/24</a:t>
             </a:fld>
             <a:endParaRPr lang="en-US"/>
           </a:p>
@@ -2365,7 +2517,7 @@
           <a:p>
             <a:fld id="{19E3F066-8095-7A47-8BBF-FB45577C0028}" type="datetimeFigureOut">
               <a:rPr lang="en-US" smtClean="0"/>
-              <a:t>11/29/22</a:t>
+              <a:t>6/19/24</a:t>
             </a:fld>
             <a:endParaRPr lang="en-US"/>
           </a:p>
@@ -2777,7 +2929,7 @@
           <a:p>
             <a:fld id="{19E3F066-8095-7A47-8BBF-FB45577C0028}" type="datetimeFigureOut">
               <a:rPr lang="en-US" smtClean="0"/>
-              <a:t>11/29/22</a:t>
+              <a:t>6/19/24</a:t>
             </a:fld>
             <a:endParaRPr lang="en-US"/>
           </a:p>
@@ -2918,7 +3070,7 @@
           <a:p>
             <a:fld id="{19E3F066-8095-7A47-8BBF-FB45577C0028}" type="datetimeFigureOut">
               <a:rPr lang="en-US" smtClean="0"/>
-              <a:t>11/29/22</a:t>
+              <a:t>6/19/24</a:t>
             </a:fld>
             <a:endParaRPr lang="en-US"/>
           </a:p>
@@ -3031,7 +3183,7 @@
           <a:p>
             <a:fld id="{19E3F066-8095-7A47-8BBF-FB45577C0028}" type="datetimeFigureOut">
               <a:rPr lang="en-US" smtClean="0"/>
-              <a:t>11/29/22</a:t>
+              <a:t>6/19/24</a:t>
             </a:fld>
             <a:endParaRPr lang="en-US"/>
           </a:p>
@@ -3342,7 +3494,7 @@
           <a:p>
             <a:fld id="{19E3F066-8095-7A47-8BBF-FB45577C0028}" type="datetimeFigureOut">
               <a:rPr lang="en-US" smtClean="0"/>
-              <a:t>11/29/22</a:t>
+              <a:t>6/19/24</a:t>
             </a:fld>
             <a:endParaRPr lang="en-US"/>
           </a:p>
@@ -3630,7 +3782,7 @@
           <a:p>
             <a:fld id="{19E3F066-8095-7A47-8BBF-FB45577C0028}" type="datetimeFigureOut">
               <a:rPr lang="en-US" smtClean="0"/>
-              <a:t>11/29/22</a:t>
+              <a:t>6/19/24</a:t>
             </a:fld>
             <a:endParaRPr lang="en-US"/>
           </a:p>
@@ -3871,7 +4023,7 @@
           <a:p>
             <a:fld id="{19E3F066-8095-7A47-8BBF-FB45577C0028}" type="datetimeFigureOut">
               <a:rPr lang="en-US" smtClean="0"/>
-              <a:t>11/29/22</a:t>
+              <a:t>6/19/24</a:t>
             </a:fld>
             <a:endParaRPr lang="en-US"/>
           </a:p>
@@ -3967,35 +4119,6 @@
           </a:p>
         </p:txBody>
       </p:sp>
-      <p:pic>
-        <p:nvPicPr>
-          <p:cNvPr id="7" name="Picture 5" descr="Picture 5">
-            <a:extLst>
-              <a:ext uri="{FF2B5EF4-FFF2-40B4-BE49-F238E27FC236}">
-                <a16:creationId xmlns:a16="http://schemas.microsoft.com/office/drawing/2014/main" id="{83CEF512-4023-EEB1-ADDB-E379BF8A37B4}"/>
-              </a:ext>
-            </a:extLst>
-          </p:cNvPr>
-          <p:cNvPicPr/>
-          <p:nvPr userDrawn="1"/>
-        </p:nvPicPr>
-        <p:blipFill>
-          <a:blip r:embed="rId15"/>
-          <a:stretch/>
-        </p:blipFill>
-        <p:spPr>
-          <a:xfrm>
-            <a:off x="9525" y="0"/>
-            <a:ext cx="1470960" cy="1201680"/>
-          </a:xfrm>
-          <a:prstGeom prst="rect">
-            <a:avLst/>
-          </a:prstGeom>
-          <a:ln w="12600">
-            <a:noFill/>
-          </a:ln>
-        </p:spPr>
-      </p:pic>
     </p:spTree>
     <p:extLst>
       <p:ext uri="{BB962C8B-B14F-4D97-AF65-F5344CB8AC3E}">
@@ -4016,8 +4139,8 @@
     <p:sldLayoutId id="2147483688" r:id="rId9"/>
     <p:sldLayoutId id="2147483689" r:id="rId10"/>
     <p:sldLayoutId id="2147483690" r:id="rId11"/>
-    <p:sldLayoutId id="2147483692" r:id="rId12"/>
-    <p:sldLayoutId id="2147483693" r:id="rId13"/>
+    <p:sldLayoutId id="2147483691" r:id="rId12"/>
+    <p:sldLayoutId id="2147483692" r:id="rId13"/>
   </p:sldLayoutIdLst>
   <p:txStyles>
     <p:titleStyle>
@@ -4365,7 +4488,7 @@
           <a:p>
             <a:fld id="{9530ACA4-BD8C-D448-95CA-FC1634E9A82C}" type="datetimeFigureOut">
               <a:rPr lang="en-US" smtClean="0"/>
-              <a:t>11/29/22</a:t>
+              <a:t>6/19/24</a:t>
             </a:fld>
             <a:endParaRPr lang="en-US"/>
           </a:p>
@@ -4778,7 +4901,7 @@
           <p:cNvPr id="2" name="Content Placeholder 1">
             <a:extLst>
               <a:ext uri="{FF2B5EF4-FFF2-40B4-BE49-F238E27FC236}">
-                <a16:creationId xmlns:a16="http://schemas.microsoft.com/office/drawing/2014/main" id="{6424299D-535A-EE7B-7BBB-37752CDCE2B3}"/>
+                <a16:creationId xmlns:a16="http://schemas.microsoft.com/office/drawing/2014/main" id="{7C1822AB-D5F0-D579-A820-812EE3C83EDD}"/>
               </a:ext>
             </a:extLst>
           </p:cNvPr>
@@ -4791,8 +4914,8 @@
         </p:nvSpPr>
         <p:spPr>
           <a:xfrm>
-            <a:off x="3296672" y="2950685"/>
-            <a:ext cx="8533378" cy="2020339"/>
+            <a:off x="349035" y="2817753"/>
+            <a:ext cx="11441743" cy="2020339"/>
           </a:xfrm>
         </p:spPr>
         <p:txBody>
@@ -4807,7 +4930,7 @@
                 <a:latin typeface="Arial" panose="020B0604020202020204" pitchFamily="34" charset="0"/>
                 <a:cs typeface="Arial" panose="020B0604020202020204" pitchFamily="34" charset="0"/>
               </a:rPr>
-              <a:t>{UNIT}</a:t>
+              <a:t>{Lesson}</a:t>
             </a:r>
           </a:p>
           <a:p>
@@ -4815,12 +4938,16 @@
               <a:buNone/>
             </a:pPr>
             <a:r>
-              <a:rPr lang="en-US" sz="6000" dirty="0">
+              <a:rPr lang="en-US" dirty="0">
                 <a:latin typeface="Arial" panose="020B0604020202020204" pitchFamily="34" charset="0"/>
                 <a:cs typeface="Arial" panose="020B0604020202020204" pitchFamily="34" charset="0"/>
               </a:rPr>
-              <a:t>{COURSE}</a:t>
-            </a:r>
+              <a:t>MASTER SLIDE DECK</a:t>
+            </a:r>
+            <a:endParaRPr lang="en-US" sz="6000" dirty="0">
+              <a:latin typeface="Arial" panose="020B0604020202020204" pitchFamily="34" charset="0"/>
+              <a:cs typeface="Arial" panose="020B0604020202020204" pitchFamily="34" charset="0"/>
+            </a:endParaRPr>
           </a:p>
         </p:txBody>
       </p:sp>
@@ -4829,7 +4956,7 @@
           <p:cNvPr id="3" name="Text Placeholder 2">
             <a:extLst>
               <a:ext uri="{FF2B5EF4-FFF2-40B4-BE49-F238E27FC236}">
-                <a16:creationId xmlns:a16="http://schemas.microsoft.com/office/drawing/2014/main" id="{4B24374E-4CC2-709F-BC3B-354075F6FB78}"/>
+                <a16:creationId xmlns:a16="http://schemas.microsoft.com/office/drawing/2014/main" id="{D94C7E47-63B7-8E9D-6345-B12B99DBCE2B}"/>
               </a:ext>
             </a:extLst>
           </p:cNvPr>
@@ -4846,13 +4973,203 @@
           <a:lstStyle/>
           <a:p>
             <a:endParaRPr lang="en-US"/>
+          </a:p>
+        </p:txBody>
+      </p:sp>
+      <p:sp>
+        <p:nvSpPr>
+          <p:cNvPr id="4" name="English">
+            <a:extLst>
+              <a:ext uri="{FF2B5EF4-FFF2-40B4-BE49-F238E27FC236}">
+                <a16:creationId xmlns:a16="http://schemas.microsoft.com/office/drawing/2014/main" id="{C31D1D8F-E2D1-CB6B-82AF-68C852DD3028}"/>
+              </a:ext>
+            </a:extLst>
+          </p:cNvPr>
+          <p:cNvSpPr/>
+          <p:nvPr/>
+        </p:nvSpPr>
+        <p:spPr>
+          <a:xfrm>
+            <a:off x="5434907" y="5220773"/>
+            <a:ext cx="1270001" cy="1270001"/>
+          </a:xfrm>
+          <a:prstGeom prst="rect">
+            <a:avLst/>
+          </a:prstGeom>
+          <a:solidFill>
+            <a:srgbClr val="FFFB00"/>
+          </a:solidFill>
+          <a:ln w="12700">
+            <a:solidFill>
+              <a:schemeClr val="accent1"/>
+            </a:solidFill>
+            <a:miter/>
+          </a:ln>
+          <a:extLst>
+            <a:ext uri="{C572A759-6A51-4108-AA02-DFA0A04FC94B}">
+              <ma14:wrappingTextBoxFlag xmlns="" xmlns:m="http://schemas.openxmlformats.org/officeDocument/2006/math" xmlns:a14="http://schemas.microsoft.com/office/drawing/2010/main" xmlns:ma14="http://schemas.microsoft.com/office/mac/drawingml/2011/main" val="1"/>
+            </a:ext>
+          </a:extLst>
+        </p:spPr>
+        <p:txBody>
+          <a:bodyPr lIns="45719" rIns="45719" anchor="ctr"/>
+          <a:lstStyle>
+            <a:lvl1pPr algn="ctr"/>
+          </a:lstStyle>
+          <a:p>
+            <a:r>
+              <a:t>English</a:t>
+            </a:r>
+          </a:p>
+        </p:txBody>
+      </p:sp>
+      <p:sp>
+        <p:nvSpPr>
+          <p:cNvPr id="5" name="Spanish">
+            <a:extLst>
+              <a:ext uri="{FF2B5EF4-FFF2-40B4-BE49-F238E27FC236}">
+                <a16:creationId xmlns:a16="http://schemas.microsoft.com/office/drawing/2014/main" id="{EDFC117A-2C79-EBA2-E09B-3CA32F1663F2}"/>
+              </a:ext>
+            </a:extLst>
+          </p:cNvPr>
+          <p:cNvSpPr/>
+          <p:nvPr/>
+        </p:nvSpPr>
+        <p:spPr>
+          <a:xfrm>
+            <a:off x="7065372" y="5220773"/>
+            <a:ext cx="1270001" cy="1270001"/>
+          </a:xfrm>
+          <a:prstGeom prst="rect">
+            <a:avLst/>
+          </a:prstGeom>
+          <a:solidFill>
+            <a:srgbClr val="FF9300"/>
+          </a:solidFill>
+          <a:ln w="12700">
+            <a:solidFill>
+              <a:schemeClr val="accent1"/>
+            </a:solidFill>
+            <a:miter/>
+          </a:ln>
+          <a:extLst>
+            <a:ext uri="{C572A759-6A51-4108-AA02-DFA0A04FC94B}">
+              <ma14:wrappingTextBoxFlag xmlns="" xmlns:m="http://schemas.openxmlformats.org/officeDocument/2006/math" xmlns:a14="http://schemas.microsoft.com/office/drawing/2010/main" xmlns:ma14="http://schemas.microsoft.com/office/mac/drawingml/2011/main" val="1"/>
+            </a:ext>
+          </a:extLst>
+        </p:spPr>
+        <p:txBody>
+          <a:bodyPr lIns="45719" rIns="45719" anchor="ctr"/>
+          <a:lstStyle>
+            <a:lvl1pPr algn="ctr"/>
+          </a:lstStyle>
+          <a:p>
+            <a:r>
+              <a:rPr dirty="0"/>
+              <a:t>Spanish</a:t>
+            </a:r>
+            <a:r>
+              <a:rPr lang="en-US" dirty="0"/>
+              <a:t> with details</a:t>
+            </a:r>
+            <a:endParaRPr dirty="0"/>
+          </a:p>
+        </p:txBody>
+      </p:sp>
+      <p:sp>
+        <p:nvSpPr>
+          <p:cNvPr id="6" name="This master slide deck is NOT used for presentation.">
+            <a:extLst>
+              <a:ext uri="{FF2B5EF4-FFF2-40B4-BE49-F238E27FC236}">
+                <a16:creationId xmlns:a16="http://schemas.microsoft.com/office/drawing/2014/main" id="{7112FC64-993F-6384-207F-8A58E6A57975}"/>
+              </a:ext>
+            </a:extLst>
+          </p:cNvPr>
+          <p:cNvSpPr txBox="1"/>
+          <p:nvPr/>
+        </p:nvSpPr>
+        <p:spPr>
+          <a:xfrm>
+            <a:off x="3622701" y="6550692"/>
+            <a:ext cx="4946598" cy="333089"/>
+          </a:xfrm>
+          <a:prstGeom prst="rect">
+            <a:avLst/>
+          </a:prstGeom>
+          <a:ln w="12700">
+            <a:miter lim="400000"/>
+          </a:ln>
+          <a:extLst>
+            <a:ext uri="{C572A759-6A51-4108-AA02-DFA0A04FC94B}">
+              <ma14:wrappingTextBoxFlag xmlns="" xmlns:m="http://schemas.openxmlformats.org/officeDocument/2006/math" xmlns:a14="http://schemas.microsoft.com/office/drawing/2010/main" xmlns:ma14="http://schemas.microsoft.com/office/mac/drawingml/2011/main" val="1"/>
+            </a:ext>
+          </a:extLst>
+        </p:spPr>
+        <p:txBody>
+          <a:bodyPr wrap="none" lIns="45719" rIns="45719">
+            <a:spAutoFit/>
+          </a:bodyPr>
+          <a:lstStyle/>
+          <a:p>
+            <a:r>
+              <a:t>This master slide deck is NOT used for presentation. </a:t>
+            </a:r>
+          </a:p>
+        </p:txBody>
+      </p:sp>
+      <p:sp>
+        <p:nvSpPr>
+          <p:cNvPr id="7" name="English">
+            <a:extLst>
+              <a:ext uri="{FF2B5EF4-FFF2-40B4-BE49-F238E27FC236}">
+                <a16:creationId xmlns:a16="http://schemas.microsoft.com/office/drawing/2014/main" id="{05CF1E25-6DF7-E46F-66E5-B04F317BEF77}"/>
+              </a:ext>
+            </a:extLst>
+          </p:cNvPr>
+          <p:cNvSpPr/>
+          <p:nvPr/>
+        </p:nvSpPr>
+        <p:spPr>
+          <a:xfrm>
+            <a:off x="3622702" y="5220772"/>
+            <a:ext cx="1424140" cy="1270001"/>
+          </a:xfrm>
+          <a:prstGeom prst="rect">
+            <a:avLst/>
+          </a:prstGeom>
+          <a:solidFill>
+            <a:schemeClr val="bg1"/>
+          </a:solidFill>
+          <a:ln w="12700">
+            <a:solidFill>
+              <a:schemeClr val="accent1"/>
+            </a:solidFill>
+            <a:miter/>
+          </a:ln>
+          <a:extLst>
+            <a:ext uri="{C572A759-6A51-4108-AA02-DFA0A04FC94B}">
+              <ma14:wrappingTextBoxFlag xmlns="" xmlns:m="http://schemas.openxmlformats.org/officeDocument/2006/math" xmlns:a14="http://schemas.microsoft.com/office/drawing/2010/main" xmlns:ma14="http://schemas.microsoft.com/office/mac/drawingml/2011/main" val="1"/>
+            </a:ext>
+          </a:extLst>
+        </p:spPr>
+        <p:txBody>
+          <a:bodyPr lIns="45719" rIns="45719" anchor="ctr"/>
+          <a:lstStyle>
+            <a:lvl1pPr algn="ctr"/>
+          </a:lstStyle>
+          <a:p>
+            <a:r>
+              <a:rPr lang="en-US" dirty="0"/>
+              <a:t>For presentation</a:t>
+            </a:r>
+            <a:endParaRPr dirty="0"/>
           </a:p>
         </p:txBody>
       </p:sp>
     </p:spTree>
     <p:extLst>
       <p:ext uri="{BB962C8B-B14F-4D97-AF65-F5344CB8AC3E}">
-        <p14:creationId xmlns:p14="http://schemas.microsoft.com/office/powerpoint/2010/main" val="1013508056"/>
+        <p14:creationId xmlns:p14="http://schemas.microsoft.com/office/powerpoint/2010/main" val="1561663183"/>
       </p:ext>
     </p:extLst>
   </p:cSld>
@@ -4881,43 +5198,57 @@
       </p:grpSpPr>
       <p:sp>
         <p:nvSpPr>
-          <p:cNvPr id="2" name="Title 1">
-            <a:extLst>
-              <a:ext uri="{FF2B5EF4-FFF2-40B4-BE49-F238E27FC236}">
-                <a16:creationId xmlns:a16="http://schemas.microsoft.com/office/drawing/2014/main" id="{0E7CCAEB-D84E-456D-3B6B-2E9573C73F98}"/>
-              </a:ext>
-            </a:extLst>
-          </p:cNvPr>
-          <p:cNvSpPr>
-            <a:spLocks noGrp="1"/>
-          </p:cNvSpPr>
-          <p:nvPr>
-            <p:ph type="title"/>
-          </p:nvPr>
-        </p:nvSpPr>
-        <p:spPr/>
+          <p:cNvPr id="2" name="Content Placeholder 1">
+            <a:extLst>
+              <a:ext uri="{FF2B5EF4-FFF2-40B4-BE49-F238E27FC236}">
+                <a16:creationId xmlns:a16="http://schemas.microsoft.com/office/drawing/2014/main" id="{7C1822AB-D5F0-D579-A820-812EE3C83EDD}"/>
+              </a:ext>
+            </a:extLst>
+          </p:cNvPr>
+          <p:cNvSpPr>
+            <a:spLocks noGrp="1"/>
+          </p:cNvSpPr>
+          <p:nvPr>
+            <p:ph/>
+          </p:nvPr>
+        </p:nvSpPr>
+        <p:spPr>
+          <a:xfrm>
+            <a:off x="375127" y="2963211"/>
+            <a:ext cx="11441743" cy="1061102"/>
+          </a:xfrm>
+        </p:spPr>
         <p:txBody>
           <a:bodyPr/>
           <a:lstStyle/>
           <a:p>
-            <a:endParaRPr lang="en-US"/>
-          </a:p>
-        </p:txBody>
-      </p:sp>
-      <p:sp>
-        <p:nvSpPr>
-          <p:cNvPr id="3" name="Content Placeholder 2">
-            <a:extLst>
-              <a:ext uri="{FF2B5EF4-FFF2-40B4-BE49-F238E27FC236}">
-                <a16:creationId xmlns:a16="http://schemas.microsoft.com/office/drawing/2014/main" id="{0A5EC664-EFAD-501E-02EA-4124C835D47B}"/>
-              </a:ext>
-            </a:extLst>
-          </p:cNvPr>
-          <p:cNvSpPr>
-            <a:spLocks noGrp="1"/>
-          </p:cNvSpPr>
-          <p:nvPr>
-            <p:ph idx="1"/>
+            <a:pPr marL="0" indent="0" algn="ctr">
+              <a:buNone/>
+            </a:pPr>
+            <a:r>
+              <a:rPr lang="en-US" sz="6000" dirty="0">
+                <a:latin typeface="Arial" panose="020B0604020202020204" pitchFamily="34" charset="0"/>
+                <a:cs typeface="Arial" panose="020B0604020202020204" pitchFamily="34" charset="0"/>
+              </a:rPr>
+              <a:t>{Lesson}</a:t>
+            </a:r>
+          </a:p>
+        </p:txBody>
+      </p:sp>
+      <p:sp>
+        <p:nvSpPr>
+          <p:cNvPr id="3" name="Text Placeholder 2">
+            <a:extLst>
+              <a:ext uri="{FF2B5EF4-FFF2-40B4-BE49-F238E27FC236}">
+                <a16:creationId xmlns:a16="http://schemas.microsoft.com/office/drawing/2014/main" id="{D94C7E47-63B7-8E9D-6345-B12B99DBCE2B}"/>
+              </a:ext>
+            </a:extLst>
+          </p:cNvPr>
+          <p:cNvSpPr>
+            <a:spLocks noGrp="1"/>
+          </p:cNvSpPr>
+          <p:nvPr>
+            <p:ph type="body" sz="quarter" idx="10"/>
           </p:nvPr>
         </p:nvSpPr>
         <p:spPr/>
@@ -4932,7 +5263,7 @@
     </p:spTree>
     <p:extLst>
       <p:ext uri="{BB962C8B-B14F-4D97-AF65-F5344CB8AC3E}">
-        <p14:creationId xmlns:p14="http://schemas.microsoft.com/office/powerpoint/2010/main" val="2792640674"/>
+        <p14:creationId xmlns:p14="http://schemas.microsoft.com/office/powerpoint/2010/main" val="2329516533"/>
       </p:ext>
     </p:extLst>
   </p:cSld>
@@ -4959,51 +5290,12 @@
           <a:chExt cx="0" cy="0"/>
         </a:xfrm>
       </p:grpSpPr>
-      <p:pic>
-        <p:nvPicPr>
-          <p:cNvPr id="8" name="Picture 7" descr="Question marks in a line and one question mark is lit">
-            <a:extLst>
-              <a:ext uri="{FF2B5EF4-FFF2-40B4-BE49-F238E27FC236}">
-                <a16:creationId xmlns:a16="http://schemas.microsoft.com/office/drawing/2014/main" id="{12797137-2A82-CF84-DC83-7388192901FD}"/>
-              </a:ext>
-            </a:extLst>
-          </p:cNvPr>
-          <p:cNvPicPr>
-            <a:picLocks noChangeAspect="1"/>
-          </p:cNvPicPr>
-          <p:nvPr/>
-        </p:nvPicPr>
-        <p:blipFill rotWithShape="1">
-          <a:blip r:embed="rId2" cstate="print">
-            <a:extLst>
-              <a:ext uri="{28A0092B-C50C-407E-A947-70E740481C1C}">
-                <a14:useLocalDpi xmlns:a14="http://schemas.microsoft.com/office/drawing/2010/main"/>
-              </a:ext>
-            </a:extLst>
-          </a:blip>
-          <a:srcRect/>
-          <a:stretch/>
-        </p:blipFill>
-        <p:spPr>
-          <a:xfrm>
-            <a:off x="609480" y="1604520"/>
-            <a:ext cx="10972440" cy="3977280"/>
-          </a:xfrm>
-          <a:prstGeom prst="rect">
-            <a:avLst/>
-          </a:prstGeom>
-          <a:noFill/>
-          <a:ln w="0">
-            <a:noFill/>
-          </a:ln>
-        </p:spPr>
-      </p:pic>
-      <p:sp>
-        <p:nvSpPr>
-          <p:cNvPr id="5" name="Title 4">
-            <a:extLst>
-              <a:ext uri="{FF2B5EF4-FFF2-40B4-BE49-F238E27FC236}">
-                <a16:creationId xmlns:a16="http://schemas.microsoft.com/office/drawing/2014/main" id="{D165FB1A-692C-4624-ECCE-A294CCE7B105}"/>
+      <p:sp>
+        <p:nvSpPr>
+          <p:cNvPr id="2" name="Title 1">
+            <a:extLst>
+              <a:ext uri="{FF2B5EF4-FFF2-40B4-BE49-F238E27FC236}">
+                <a16:creationId xmlns:a16="http://schemas.microsoft.com/office/drawing/2014/main" id="{0E7CCAEB-D84E-456D-3B6B-2E9573C73F98}"/>
               </a:ext>
             </a:extLst>
           </p:cNvPr>
@@ -5014,38 +5306,44 @@
             <p:ph type="title"/>
           </p:nvPr>
         </p:nvSpPr>
-        <p:spPr>
-          <a:xfrm>
-            <a:off x="1453320" y="262440"/>
-            <a:ext cx="9018360" cy="907454"/>
-          </a:xfrm>
-        </p:spPr>
-        <p:txBody>
-          <a:bodyPr anchor="t">
-            <a:normAutofit/>
-          </a:bodyPr>
-          <a:lstStyle/>
-          <a:p>
-            <a:pPr marL="0" indent="0" algn="ctr">
-              <a:buNone/>
-            </a:pPr>
-            <a:r>
-              <a:rPr lang="en-US" sz="3800" b="1" dirty="0">
-                <a:solidFill>
-                  <a:srgbClr val="000000"/>
-                </a:solidFill>
-                <a:latin typeface="Arial" panose="020B0604020202020204" pitchFamily="34" charset="0"/>
-                <a:cs typeface="Arial" panose="020B0604020202020204" pitchFamily="34" charset="0"/>
-              </a:rPr>
-              <a:t>Why Does It Matter To You?</a:t>
-            </a:r>
+        <p:spPr/>
+        <p:txBody>
+          <a:bodyPr/>
+          <a:lstStyle/>
+          <a:p>
+            <a:endParaRPr lang="en-US"/>
+          </a:p>
+        </p:txBody>
+      </p:sp>
+      <p:sp>
+        <p:nvSpPr>
+          <p:cNvPr id="3" name="Content Placeholder 2">
+            <a:extLst>
+              <a:ext uri="{FF2B5EF4-FFF2-40B4-BE49-F238E27FC236}">
+                <a16:creationId xmlns:a16="http://schemas.microsoft.com/office/drawing/2014/main" id="{0A5EC664-EFAD-501E-02EA-4124C835D47B}"/>
+              </a:ext>
+            </a:extLst>
+          </p:cNvPr>
+          <p:cNvSpPr>
+            <a:spLocks noGrp="1"/>
+          </p:cNvSpPr>
+          <p:nvPr>
+            <p:ph idx="1"/>
+          </p:nvPr>
+        </p:nvSpPr>
+        <p:spPr/>
+        <p:txBody>
+          <a:bodyPr/>
+          <a:lstStyle/>
+          <a:p>
+            <a:endParaRPr lang="en-US"/>
           </a:p>
         </p:txBody>
       </p:sp>
     </p:spTree>
     <p:extLst>
       <p:ext uri="{BB962C8B-B14F-4D97-AF65-F5344CB8AC3E}">
-        <p14:creationId xmlns:p14="http://schemas.microsoft.com/office/powerpoint/2010/main" val="2358251488"/>
+        <p14:creationId xmlns:p14="http://schemas.microsoft.com/office/powerpoint/2010/main" val="2792640674"/>
       </p:ext>
     </p:extLst>
   </p:cSld>
@@ -5056,6 +5354,127 @@
 </file>
 
 <file path=ppt/slides/slide4.xml><?xml version="1.0" encoding="utf-8"?>
+<p:sld xmlns:a="http://schemas.openxmlformats.org/drawingml/2006/main" xmlns:r="http://schemas.openxmlformats.org/officeDocument/2006/relationships" xmlns:p="http://schemas.openxmlformats.org/presentationml/2006/main">
+  <p:cSld>
+    <p:bg>
+      <p:bgPr>
+        <a:solidFill>
+          <a:srgbClr val="FFFF00"/>
+        </a:solidFill>
+        <a:effectLst/>
+      </p:bgPr>
+    </p:bg>
+    <p:spTree>
+      <p:nvGrpSpPr>
+        <p:cNvPr id="1" name=""/>
+        <p:cNvGrpSpPr/>
+        <p:nvPr/>
+      </p:nvGrpSpPr>
+      <p:grpSpPr>
+        <a:xfrm>
+          <a:off x="0" y="0"/>
+          <a:ext cx="0" cy="0"/>
+          <a:chOff x="0" y="0"/>
+          <a:chExt cx="0" cy="0"/>
+        </a:xfrm>
+      </p:grpSpPr>
+      <p:pic>
+        <p:nvPicPr>
+          <p:cNvPr id="185" name="Picture 7" descr="Picture 7"/>
+          <p:cNvPicPr>
+            <a:picLocks noChangeAspect="1"/>
+          </p:cNvPicPr>
+          <p:nvPr/>
+        </p:nvPicPr>
+        <p:blipFill>
+          <a:blip r:embed="rId2"/>
+          <a:stretch>
+            <a:fillRect/>
+          </a:stretch>
+        </p:blipFill>
+        <p:spPr>
+          <a:xfrm>
+            <a:off x="609479" y="1604519"/>
+            <a:ext cx="10972442" cy="3977282"/>
+          </a:xfrm>
+          <a:prstGeom prst="rect">
+            <a:avLst/>
+          </a:prstGeom>
+          <a:ln w="12700">
+            <a:miter lim="400000"/>
+          </a:ln>
+        </p:spPr>
+      </p:pic>
+      <p:sp>
+        <p:nvSpPr>
+          <p:cNvPr id="186" name="Title 4"/>
+          <p:cNvSpPr txBox="1">
+            <a:spLocks noGrp="1"/>
+          </p:cNvSpPr>
+          <p:nvPr>
+            <p:ph type="title"/>
+          </p:nvPr>
+        </p:nvSpPr>
+        <p:spPr>
+          <a:xfrm>
+            <a:off x="1453319" y="262439"/>
+            <a:ext cx="9018362" cy="907455"/>
+          </a:xfrm>
+          <a:prstGeom prst="rect">
+            <a:avLst/>
+          </a:prstGeom>
+        </p:spPr>
+        <p:txBody>
+          <a:bodyPr anchor="t"/>
+          <a:lstStyle/>
+          <a:p>
+            <a:r>
+              <a:t>Why Does It Matter To You?</a:t>
+            </a:r>
+          </a:p>
+        </p:txBody>
+      </p:sp>
+      <p:sp>
+        <p:nvSpPr>
+          <p:cNvPr id="187" name="Slide Number"/>
+          <p:cNvSpPr txBox="1">
+            <a:spLocks noGrp="1"/>
+          </p:cNvSpPr>
+          <p:nvPr>
+            <p:ph type="sldNum" sz="quarter" idx="2"/>
+          </p:nvPr>
+        </p:nvSpPr>
+        <p:spPr>
+          <a:prstGeom prst="rect">
+            <a:avLst/>
+          </a:prstGeom>
+          <a:extLst>
+            <a:ext uri="{C572A759-6A51-4108-AA02-DFA0A04FC94B}">
+              <ma14:wrappingTextBoxFlag xmlns="" xmlns:m="http://schemas.openxmlformats.org/officeDocument/2006/math" xmlns:a14="http://schemas.microsoft.com/office/drawing/2010/main" xmlns:ma14="http://schemas.microsoft.com/office/mac/drawingml/2011/main" val="1"/>
+            </a:ext>
+          </a:extLst>
+        </p:spPr>
+        <p:txBody>
+          <a:bodyPr/>
+          <a:lstStyle/>
+          <a:p>
+            <a:fld id="{86CB4B4D-7CA3-9044-876B-883B54F8677D}" type="slidenum">
+              <a:t>4</a:t>
+            </a:fld>
+            <a:endParaRPr/>
+          </a:p>
+        </p:txBody>
+      </p:sp>
+    </p:spTree>
+  </p:cSld>
+  <p:clrMapOvr>
+    <a:masterClrMapping/>
+  </p:clrMapOvr>
+  <p:transition spd="med"/>
+</p:sld>
+</file>
+
+<file path=ppt/slides/slide5.xml><?xml version="1.0" encoding="utf-8"?>
 <p:sld xmlns:a="http://schemas.openxmlformats.org/drawingml/2006/main" xmlns:r="http://schemas.openxmlformats.org/officeDocument/2006/relationships" xmlns:p="http://schemas.openxmlformats.org/presentationml/2006/main">
   <p:cSld>
     <p:spTree>
@@ -5072,73 +5491,189 @@
           <a:chExt cx="0" cy="0"/>
         </a:xfrm>
       </p:grpSpPr>
-      <p:sp>
-        <p:nvSpPr>
-          <p:cNvPr id="3" name="Title 2">
-            <a:extLst>
-              <a:ext uri="{FF2B5EF4-FFF2-40B4-BE49-F238E27FC236}">
-                <a16:creationId xmlns:a16="http://schemas.microsoft.com/office/drawing/2014/main" id="{8459A4B7-C890-7C19-9A85-49CF2F1C6DE2}"/>
-              </a:ext>
-            </a:extLst>
-          </p:cNvPr>
-          <p:cNvSpPr>
-            <a:spLocks noGrp="1"/>
-          </p:cNvSpPr>
-          <p:nvPr>
-            <p:ph type="title" idx="4294967295"/>
-          </p:nvPr>
-        </p:nvSpPr>
-        <p:spPr>
-          <a:xfrm>
-            <a:off x="2154607" y="2531860"/>
-            <a:ext cx="3658053" cy="1786515"/>
-          </a:xfrm>
-        </p:spPr>
-        <p:txBody>
-          <a:bodyPr vert="horz" lIns="91440" tIns="45720" rIns="91440" bIns="45720" rtlCol="0" anchor="t">
-            <a:normAutofit/>
-          </a:bodyPr>
-          <a:lstStyle/>
-          <a:p>
-            <a:r>
-              <a:rPr lang="en-US" sz="4800" b="1" kern="1200" dirty="0">
-                <a:solidFill>
-                  <a:schemeClr val="tx2"/>
-                </a:solidFill>
-                <a:latin typeface="+mj-lt"/>
-                <a:ea typeface="+mj-ea"/>
-                <a:cs typeface="+mj-cs"/>
-              </a:rPr>
-              <a:t>TAKE A BREAK</a:t>
-            </a:r>
-          </a:p>
-        </p:txBody>
-      </p:sp>
       <p:pic>
         <p:nvPicPr>
-          <p:cNvPr id="14" name="Graphic 13" descr="Coffee">
-            <a:extLst>
-              <a:ext uri="{FF2B5EF4-FFF2-40B4-BE49-F238E27FC236}">
-                <a16:creationId xmlns:a16="http://schemas.microsoft.com/office/drawing/2014/main" id="{18E50972-98B0-2FA6-4E20-46196C902A48}"/>
-              </a:ext>
-            </a:extLst>
-          </p:cNvPr>
+          <p:cNvPr id="189" name="Picture 7" descr="Picture 7"/>
           <p:cNvPicPr>
             <a:picLocks noChangeAspect="1"/>
           </p:cNvPicPr>
           <p:nvPr/>
         </p:nvPicPr>
         <p:blipFill>
-          <a:blip r:embed="rId3">
-            <a:extLst>
-              <a:ext uri="{28A0092B-C50C-407E-A947-70E740481C1C}">
-                <a14:useLocalDpi xmlns:a14="http://schemas.microsoft.com/office/drawing/2010/main"/>
-              </a:ext>
-              <a:ext uri="{96DAC541-7B7A-43D3-8B79-37D633B846F1}">
-                <asvg:svgBlip xmlns:asvg="http://schemas.microsoft.com/office/drawing/2016/SVG/main" r:embed="rId4"/>
-              </a:ext>
-            </a:extLst>
-          </a:blip>
+          <a:blip r:embed="rId2"/>
+          <a:stretch>
+            <a:fillRect/>
+          </a:stretch>
+        </p:blipFill>
+        <p:spPr>
+          <a:xfrm>
+            <a:off x="609479" y="1604519"/>
+            <a:ext cx="10972442" cy="3977282"/>
+          </a:xfrm>
+          <a:prstGeom prst="rect">
+            <a:avLst/>
+          </a:prstGeom>
+          <a:ln w="12700">
+            <a:miter lim="400000"/>
+          </a:ln>
+        </p:spPr>
+      </p:pic>
+      <p:sp>
+        <p:nvSpPr>
+          <p:cNvPr id="190" name="Title 4"/>
+          <p:cNvSpPr txBox="1">
+            <a:spLocks noGrp="1"/>
+          </p:cNvSpPr>
+          <p:nvPr>
+            <p:ph type="title"/>
+          </p:nvPr>
+        </p:nvSpPr>
+        <p:spPr>
+          <a:xfrm>
+            <a:off x="1453319" y="262439"/>
+            <a:ext cx="9018362" cy="907455"/>
+          </a:xfrm>
+          <a:prstGeom prst="rect">
+            <a:avLst/>
+          </a:prstGeom>
+        </p:spPr>
+        <p:txBody>
+          <a:bodyPr anchor="t"/>
+          <a:lstStyle/>
+          <a:p>
+            <a:r>
+              <a:t>¿Por Qué Te Importa?</a:t>
+            </a:r>
+          </a:p>
+        </p:txBody>
+      </p:sp>
+      <p:sp>
+        <p:nvSpPr>
+          <p:cNvPr id="191" name="Slide Number"/>
+          <p:cNvSpPr txBox="1">
+            <a:spLocks noGrp="1"/>
+          </p:cNvSpPr>
+          <p:nvPr>
+            <p:ph type="sldNum" sz="quarter" idx="2"/>
+          </p:nvPr>
+        </p:nvSpPr>
+        <p:spPr>
+          <a:prstGeom prst="rect">
+            <a:avLst/>
+          </a:prstGeom>
+          <a:extLst>
+            <a:ext uri="{C572A759-6A51-4108-AA02-DFA0A04FC94B}">
+              <ma14:wrappingTextBoxFlag xmlns="" xmlns:m="http://schemas.openxmlformats.org/officeDocument/2006/math" xmlns:a14="http://schemas.microsoft.com/office/drawing/2010/main" xmlns:ma14="http://schemas.microsoft.com/office/mac/drawingml/2011/main" val="1"/>
+            </a:ext>
+          </a:extLst>
+        </p:spPr>
+        <p:txBody>
+          <a:bodyPr/>
+          <a:lstStyle/>
+          <a:p>
+            <a:fld id="{86CB4B4D-7CA3-9044-876B-883B54F8677D}" type="slidenum">
+              <a:t>5</a:t>
+            </a:fld>
+            <a:endParaRPr/>
+          </a:p>
+        </p:txBody>
+      </p:sp>
+    </p:spTree>
+  </p:cSld>
+  <p:clrMapOvr>
+    <a:masterClrMapping/>
+  </p:clrMapOvr>
+  <mc:AlternateContent xmlns:mc="http://schemas.openxmlformats.org/markup-compatibility/2006" xmlns:p14="http://schemas.microsoft.com/office/powerpoint/2010/main">
+    <mc:Choice Requires="p14">
+      <p:transition spd="slow" p14:dur="1200">
+        <p:push dir="u"/>
+      </p:transition>
+    </mc:Choice>
+    <mc:Fallback xmlns="" xmlns:m="http://schemas.openxmlformats.org/officeDocument/2006/math" xmlns:a14="http://schemas.microsoft.com/office/drawing/2010/main">
+      <p:transition spd="slow">
+        <p:fade/>
+      </p:transition>
+    </mc:Fallback>
+  </mc:AlternateContent>
+</p:sld>
+</file>
+
+<file path=ppt/slides/slide6.xml><?xml version="1.0" encoding="utf-8"?>
+<p:sld xmlns:a="http://schemas.openxmlformats.org/drawingml/2006/main" xmlns:r="http://schemas.openxmlformats.org/officeDocument/2006/relationships" xmlns:p="http://schemas.openxmlformats.org/presentationml/2006/main">
+  <p:cSld>
+    <p:bg>
+      <p:bgPr>
+        <a:solidFill>
+          <a:srgbClr val="FFFF00"/>
+        </a:solidFill>
+        <a:effectLst/>
+      </p:bgPr>
+    </p:bg>
+    <p:spTree>
+      <p:nvGrpSpPr>
+        <p:cNvPr id="1" name=""/>
+        <p:cNvGrpSpPr/>
+        <p:nvPr/>
+      </p:nvGrpSpPr>
+      <p:grpSpPr>
+        <a:xfrm>
+          <a:off x="0" y="0"/>
+          <a:ext cx="0" cy="0"/>
+          <a:chOff x="0" y="0"/>
+          <a:chExt cx="0" cy="0"/>
+        </a:xfrm>
+      </p:grpSpPr>
+      <p:sp>
+        <p:nvSpPr>
+          <p:cNvPr id="193" name="Title 2"/>
+          <p:cNvSpPr txBox="1">
+            <a:spLocks noGrp="1"/>
+          </p:cNvSpPr>
+          <p:nvPr>
+            <p:ph type="title" idx="4294967295"/>
+          </p:nvPr>
+        </p:nvSpPr>
+        <p:spPr>
+          <a:xfrm>
+            <a:off x="2154607" y="2531859"/>
+            <a:ext cx="3658054" cy="1786516"/>
+          </a:xfrm>
+          <a:prstGeom prst="rect">
+            <a:avLst/>
+          </a:prstGeom>
+        </p:spPr>
+        <p:txBody>
+          <a:bodyPr anchor="t"/>
+          <a:lstStyle>
+            <a:lvl1pPr>
+              <a:defRPr sz="4800" b="0">
+                <a:solidFill>
+                  <a:srgbClr val="44546A"/>
+                </a:solidFill>
+                <a:latin typeface="Calibri Light"/>
+                <a:ea typeface="Calibri Light"/>
+                <a:cs typeface="Calibri Light"/>
+                <a:sym typeface="Calibri Light"/>
+              </a:defRPr>
+            </a:lvl1pPr>
+          </a:lstStyle>
+          <a:p>
+            <a:r>
+              <a:t>TAKE A BREAK</a:t>
+            </a:r>
+          </a:p>
+        </p:txBody>
+      </p:sp>
+      <p:pic>
+        <p:nvPicPr>
+          <p:cNvPr id="194" name="Graphic 13" descr="Graphic 13"/>
+          <p:cNvPicPr>
+            <a:picLocks noChangeAspect="1"/>
+          </p:cNvPicPr>
+          <p:nvPr/>
+        </p:nvPicPr>
+        <p:blipFill>
+          <a:blip r:embed="rId2"/>
           <a:stretch>
             <a:fillRect/>
           </a:stretch>
@@ -5146,69 +5681,268 @@
         <p:spPr>
           <a:xfrm>
             <a:off x="6379342" y="-259377"/>
-            <a:ext cx="5029200" cy="5029200"/>
+            <a:ext cx="5029201" cy="5029201"/>
           </a:xfrm>
           <a:prstGeom prst="rect">
             <a:avLst/>
           </a:prstGeom>
-          <a:ln w="9525">
-            <a:noFill/>
+          <a:ln w="12700">
+            <a:miter lim="400000"/>
           </a:ln>
         </p:spPr>
       </p:pic>
       <p:sp>
         <p:nvSpPr>
-          <p:cNvPr id="2" name="TextBox 1">
-            <a:extLst>
-              <a:ext uri="{FF2B5EF4-FFF2-40B4-BE49-F238E27FC236}">
-                <a16:creationId xmlns:a16="http://schemas.microsoft.com/office/drawing/2014/main" id="{A1B7F749-D607-3F3E-08CD-A06E76E4C25B}"/>
-              </a:ext>
-            </a:extLst>
-          </p:cNvPr>
+          <p:cNvPr id="195" name="TextBox 1"/>
           <p:cNvSpPr txBox="1"/>
           <p:nvPr/>
         </p:nvSpPr>
         <p:spPr>
           <a:xfrm>
-            <a:off x="3669695" y="5405718"/>
-            <a:ext cx="4852610" cy="738664"/>
+            <a:off x="3715415" y="5405718"/>
+            <a:ext cx="3986136" cy="634118"/>
           </a:xfrm>
           <a:prstGeom prst="rect">
             <a:avLst/>
           </a:prstGeom>
-          <a:noFill/>
+          <a:ln w="12700">
+            <a:miter lim="400000"/>
+          </a:ln>
+          <a:extLst>
+            <a:ext uri="{C572A759-6A51-4108-AA02-DFA0A04FC94B}">
+              <ma14:wrappingTextBoxFlag xmlns="" xmlns:m="http://schemas.openxmlformats.org/officeDocument/2006/math" xmlns:a14="http://schemas.microsoft.com/office/drawing/2010/main" xmlns:ma14="http://schemas.microsoft.com/office/mac/drawingml/2011/main" val="1"/>
+            </a:ext>
+          </a:extLst>
         </p:spPr>
         <p:txBody>
-          <a:bodyPr wrap="none" rtlCol="0">
+          <a:bodyPr wrap="none" lIns="45719" rIns="45719">
             <a:spAutoFit/>
           </a:bodyPr>
-          <a:lstStyle/>
-          <a:p>
-            <a:r>
-              <a:rPr lang="en-US" sz="4200" b="1" dirty="0"/>
+          <a:lstStyle>
+            <a:lvl1pPr>
+              <a:defRPr sz="4200" b="1"/>
+            </a:lvl1pPr>
+          </a:lstStyle>
+          <a:p>
+            <a:r>
               <a:t>Return By: XX:XX </a:t>
             </a:r>
           </a:p>
         </p:txBody>
       </p:sp>
+      <p:sp>
+        <p:nvSpPr>
+          <p:cNvPr id="196" name="Slide Number"/>
+          <p:cNvSpPr txBox="1">
+            <a:spLocks noGrp="1"/>
+          </p:cNvSpPr>
+          <p:nvPr>
+            <p:ph type="sldNum" sz="quarter" idx="2"/>
+          </p:nvPr>
+        </p:nvSpPr>
+        <p:spPr>
+          <a:prstGeom prst="rect">
+            <a:avLst/>
+          </a:prstGeom>
+          <a:extLst>
+            <a:ext uri="{C572A759-6A51-4108-AA02-DFA0A04FC94B}">
+              <ma14:wrappingTextBoxFlag xmlns="" xmlns:m="http://schemas.openxmlformats.org/officeDocument/2006/math" xmlns:a14="http://schemas.microsoft.com/office/drawing/2010/main" xmlns:ma14="http://schemas.microsoft.com/office/mac/drawingml/2011/main" val="1"/>
+            </a:ext>
+          </a:extLst>
+        </p:spPr>
+        <p:txBody>
+          <a:bodyPr/>
+          <a:lstStyle/>
+          <a:p>
+            <a:fld id="{86CB4B4D-7CA3-9044-876B-883B54F8677D}" type="slidenum">
+              <a:rPr/>
+              <a:t>6</a:t>
+            </a:fld>
+            <a:endParaRPr/>
+          </a:p>
+        </p:txBody>
+      </p:sp>
     </p:spTree>
-    <p:extLst>
-      <p:ext uri="{BB962C8B-B14F-4D97-AF65-F5344CB8AC3E}">
-        <p14:creationId xmlns:p14="http://schemas.microsoft.com/office/powerpoint/2010/main" val="1316225382"/>
-      </p:ext>
-    </p:extLst>
   </p:cSld>
   <p:clrMapOvr>
     <a:masterClrMapping/>
   </p:clrMapOvr>
-  <p:transition spd="slow">
-    <p:push dir="u"/>
-    <p:sndAc>
-      <p:stSnd>
-        <p:snd r:embed="rId2" name="voltage.wav"/>
-      </p:stSnd>
-    </p:sndAc>
-  </p:transition>
+  <mc:AlternateContent xmlns:mc="http://schemas.openxmlformats.org/markup-compatibility/2006" xmlns:p14="http://schemas.microsoft.com/office/powerpoint/2010/main">
+    <mc:Choice Requires="p14">
+      <p:transition spd="slow" p14:dur="1200">
+        <p:push dir="u"/>
+      </p:transition>
+    </mc:Choice>
+    <mc:Fallback xmlns="" xmlns:m="http://schemas.openxmlformats.org/officeDocument/2006/math" xmlns:a14="http://schemas.microsoft.com/office/drawing/2010/main">
+      <p:transition spd="slow">
+        <p:fade/>
+      </p:transition>
+    </mc:Fallback>
+  </mc:AlternateContent>
+</p:sld>
+</file>
+
+<file path=ppt/slides/slide7.xml><?xml version="1.0" encoding="utf-8"?>
+<p:sld xmlns:a="http://schemas.openxmlformats.org/drawingml/2006/main" xmlns:r="http://schemas.openxmlformats.org/officeDocument/2006/relationships" xmlns:p="http://schemas.openxmlformats.org/presentationml/2006/main">
+  <p:cSld>
+    <p:spTree>
+      <p:nvGrpSpPr>
+        <p:cNvPr id="1" name=""/>
+        <p:cNvGrpSpPr/>
+        <p:nvPr/>
+      </p:nvGrpSpPr>
+      <p:grpSpPr>
+        <a:xfrm>
+          <a:off x="0" y="0"/>
+          <a:ext cx="0" cy="0"/>
+          <a:chOff x="0" y="0"/>
+          <a:chExt cx="0" cy="0"/>
+        </a:xfrm>
+      </p:grpSpPr>
+      <p:sp>
+        <p:nvSpPr>
+          <p:cNvPr id="198" name="Title 2"/>
+          <p:cNvSpPr txBox="1">
+            <a:spLocks noGrp="1"/>
+          </p:cNvSpPr>
+          <p:nvPr>
+            <p:ph type="title" idx="4294967295"/>
+          </p:nvPr>
+        </p:nvSpPr>
+        <p:spPr>
+          <a:xfrm>
+            <a:off x="2154607" y="2531859"/>
+            <a:ext cx="3658054" cy="1786516"/>
+          </a:xfrm>
+          <a:prstGeom prst="rect">
+            <a:avLst/>
+          </a:prstGeom>
+        </p:spPr>
+        <p:txBody>
+          <a:bodyPr anchor="t"/>
+          <a:lstStyle>
+            <a:lvl1pPr>
+              <a:defRPr sz="4800" b="0">
+                <a:solidFill>
+                  <a:srgbClr val="44546A"/>
+                </a:solidFill>
+                <a:latin typeface="Calibri Light"/>
+                <a:ea typeface="Calibri Light"/>
+                <a:cs typeface="Calibri Light"/>
+                <a:sym typeface="Calibri Light"/>
+              </a:defRPr>
+            </a:lvl1pPr>
+          </a:lstStyle>
+          <a:p>
+            <a:r>
+              <a:t>TOMAR UN DESCANSO</a:t>
+            </a:r>
+          </a:p>
+        </p:txBody>
+      </p:sp>
+      <p:pic>
+        <p:nvPicPr>
+          <p:cNvPr id="199" name="Graphic 13" descr="Graphic 13"/>
+          <p:cNvPicPr>
+            <a:picLocks noChangeAspect="1"/>
+          </p:cNvPicPr>
+          <p:nvPr/>
+        </p:nvPicPr>
+        <p:blipFill>
+          <a:blip r:embed="rId2"/>
+          <a:stretch>
+            <a:fillRect/>
+          </a:stretch>
+        </p:blipFill>
+        <p:spPr>
+          <a:xfrm>
+            <a:off x="6379342" y="-259377"/>
+            <a:ext cx="5029201" cy="5029201"/>
+          </a:xfrm>
+          <a:prstGeom prst="rect">
+            <a:avLst/>
+          </a:prstGeom>
+          <a:ln w="12700">
+            <a:miter lim="400000"/>
+          </a:ln>
+        </p:spPr>
+      </p:pic>
+      <p:sp>
+        <p:nvSpPr>
+          <p:cNvPr id="200" name="TextBox 1"/>
+          <p:cNvSpPr txBox="1"/>
+          <p:nvPr/>
+        </p:nvSpPr>
+        <p:spPr>
+          <a:xfrm>
+            <a:off x="3715415" y="5405718"/>
+            <a:ext cx="4111933" cy="634118"/>
+          </a:xfrm>
+          <a:prstGeom prst="rect">
+            <a:avLst/>
+          </a:prstGeom>
+          <a:ln w="12700">
+            <a:miter lim="400000"/>
+          </a:ln>
+          <a:extLst>
+            <a:ext uri="{C572A759-6A51-4108-AA02-DFA0A04FC94B}">
+              <ma14:wrappingTextBoxFlag xmlns="" xmlns:m="http://schemas.openxmlformats.org/officeDocument/2006/math" xmlns:a14="http://schemas.microsoft.com/office/drawing/2010/main" xmlns:ma14="http://schemas.microsoft.com/office/mac/drawingml/2011/main" val="1"/>
+            </a:ext>
+          </a:extLst>
+        </p:spPr>
+        <p:txBody>
+          <a:bodyPr wrap="none" lIns="45719" rIns="45719">
+            <a:spAutoFit/>
+          </a:bodyPr>
+          <a:lstStyle>
+            <a:lvl1pPr>
+              <a:defRPr sz="4200" b="1"/>
+            </a:lvl1pPr>
+          </a:lstStyle>
+          <a:p>
+            <a:r>
+              <a:t>Volver por: XX:XX </a:t>
+            </a:r>
+          </a:p>
+        </p:txBody>
+      </p:sp>
+      <p:sp>
+        <p:nvSpPr>
+          <p:cNvPr id="201" name="Slide Number"/>
+          <p:cNvSpPr txBox="1">
+            <a:spLocks noGrp="1"/>
+          </p:cNvSpPr>
+          <p:nvPr>
+            <p:ph type="sldNum" sz="quarter" idx="2"/>
+          </p:nvPr>
+        </p:nvSpPr>
+        <p:spPr>
+          <a:prstGeom prst="rect">
+            <a:avLst/>
+          </a:prstGeom>
+          <a:extLst>
+            <a:ext uri="{C572A759-6A51-4108-AA02-DFA0A04FC94B}">
+              <ma14:wrappingTextBoxFlag xmlns="" xmlns:m="http://schemas.openxmlformats.org/officeDocument/2006/math" xmlns:a14="http://schemas.microsoft.com/office/drawing/2010/main" xmlns:ma14="http://schemas.microsoft.com/office/mac/drawingml/2011/main" val="1"/>
+            </a:ext>
+          </a:extLst>
+        </p:spPr>
+        <p:txBody>
+          <a:bodyPr/>
+          <a:lstStyle/>
+          <a:p>
+            <a:fld id="{86CB4B4D-7CA3-9044-876B-883B54F8677D}" type="slidenum">
+              <a:t>7</a:t>
+            </a:fld>
+            <a:endParaRPr/>
+          </a:p>
+        </p:txBody>
+      </p:sp>
+    </p:spTree>
+  </p:cSld>
+  <p:clrMapOvr>
+    <a:masterClrMapping/>
+  </p:clrMapOvr>
+  <p:transition spd="med"/>
 </p:sld>
 </file>
 

</xml_diff>

<commit_message>
made the first slide orange when marking the master slide title
</commit_message>
<xml_diff>
--- a/Development-Training_Name/4-Implement/Lesson_Plans-POI_NAME/Lesson_Plan01-NAME/Audio_Visual-Template/Lesson_Slide-LESSON_NAME.pptx
+++ b/Development-Training_Name/4-Implement/Lesson_Plans-POI_NAME/Lesson_Plan01-NAME/Audio_Visual-Template/Lesson_Slide-LESSON_NAME.pptx
@@ -4882,6 +4882,14 @@
 <file path=ppt/slides/slide1.xml><?xml version="1.0" encoding="utf-8"?>
 <p:sld xmlns:a="http://schemas.openxmlformats.org/drawingml/2006/main" xmlns:r="http://schemas.openxmlformats.org/officeDocument/2006/relationships" xmlns:p="http://schemas.openxmlformats.org/presentationml/2006/main">
   <p:cSld>
+    <p:bg>
+      <p:bgPr>
+        <a:solidFill>
+          <a:schemeClr val="accent4"/>
+        </a:solidFill>
+        <a:effectLst/>
+      </p:bgPr>
+    </p:bg>
     <p:spTree>
       <p:nvGrpSpPr>
         <p:cNvPr id="1" name=""/>
@@ -5007,7 +5015,7 @@
           </a:ln>
           <a:extLst>
             <a:ext uri="{C572A759-6A51-4108-AA02-DFA0A04FC94B}">
-              <ma14:wrappingTextBoxFlag xmlns="" xmlns:m="http://schemas.openxmlformats.org/officeDocument/2006/math" xmlns:a14="http://schemas.microsoft.com/office/drawing/2010/main" xmlns:ma14="http://schemas.microsoft.com/office/mac/drawingml/2011/main" val="1"/>
+              <ma14:wrappingTextBoxFlag xmlns:ma14="http://schemas.microsoft.com/office/mac/drawingml/2011/main" xmlns:a14="http://schemas.microsoft.com/office/drawing/2010/main" xmlns:m="http://schemas.openxmlformats.org/officeDocument/2006/math" xmlns="" val="1"/>
             </a:ext>
           </a:extLst>
         </p:spPr>
@@ -5054,7 +5062,7 @@
           </a:ln>
           <a:extLst>
             <a:ext uri="{C572A759-6A51-4108-AA02-DFA0A04FC94B}">
-              <ma14:wrappingTextBoxFlag xmlns="" xmlns:m="http://schemas.openxmlformats.org/officeDocument/2006/math" xmlns:a14="http://schemas.microsoft.com/office/drawing/2010/main" xmlns:ma14="http://schemas.microsoft.com/office/mac/drawingml/2011/main" val="1"/>
+              <ma14:wrappingTextBoxFlag xmlns:ma14="http://schemas.microsoft.com/office/mac/drawingml/2011/main" xmlns:a14="http://schemas.microsoft.com/office/drawing/2010/main" xmlns:m="http://schemas.openxmlformats.org/officeDocument/2006/math" xmlns="" val="1"/>
             </a:ext>
           </a:extLst>
         </p:spPr>
@@ -5101,7 +5109,7 @@
           </a:ln>
           <a:extLst>
             <a:ext uri="{C572A759-6A51-4108-AA02-DFA0A04FC94B}">
-              <ma14:wrappingTextBoxFlag xmlns="" xmlns:m="http://schemas.openxmlformats.org/officeDocument/2006/math" xmlns:a14="http://schemas.microsoft.com/office/drawing/2010/main" xmlns:ma14="http://schemas.microsoft.com/office/mac/drawingml/2011/main" val="1"/>
+              <ma14:wrappingTextBoxFlag xmlns:ma14="http://schemas.microsoft.com/office/mac/drawingml/2011/main" xmlns:a14="http://schemas.microsoft.com/office/drawing/2010/main" xmlns:m="http://schemas.openxmlformats.org/officeDocument/2006/math" xmlns="" val="1"/>
             </a:ext>
           </a:extLst>
         </p:spPr>
@@ -5148,7 +5156,7 @@
           </a:ln>
           <a:extLst>
             <a:ext uri="{C572A759-6A51-4108-AA02-DFA0A04FC94B}">
-              <ma14:wrappingTextBoxFlag xmlns="" xmlns:m="http://schemas.openxmlformats.org/officeDocument/2006/math" xmlns:a14="http://schemas.microsoft.com/office/drawing/2010/main" xmlns:ma14="http://schemas.microsoft.com/office/mac/drawingml/2011/main" val="1"/>
+              <ma14:wrappingTextBoxFlag xmlns:ma14="http://schemas.microsoft.com/office/mac/drawingml/2011/main" xmlns:a14="http://schemas.microsoft.com/office/drawing/2010/main" xmlns:m="http://schemas.openxmlformats.org/officeDocument/2006/math" xmlns="" val="1"/>
             </a:ext>
           </a:extLst>
         </p:spPr>
@@ -5450,7 +5458,7 @@
           </a:prstGeom>
           <a:extLst>
             <a:ext uri="{C572A759-6A51-4108-AA02-DFA0A04FC94B}">
-              <ma14:wrappingTextBoxFlag xmlns="" xmlns:m="http://schemas.openxmlformats.org/officeDocument/2006/math" xmlns:a14="http://schemas.microsoft.com/office/drawing/2010/main" xmlns:ma14="http://schemas.microsoft.com/office/mac/drawingml/2011/main" val="1"/>
+              <ma14:wrappingTextBoxFlag xmlns:ma14="http://schemas.microsoft.com/office/mac/drawingml/2011/main" xmlns:a14="http://schemas.microsoft.com/office/drawing/2010/main" xmlns:m="http://schemas.openxmlformats.org/officeDocument/2006/math" xmlns="" val="1"/>
             </a:ext>
           </a:extLst>
         </p:spPr>
@@ -5563,7 +5571,7 @@
           </a:prstGeom>
           <a:extLst>
             <a:ext uri="{C572A759-6A51-4108-AA02-DFA0A04FC94B}">
-              <ma14:wrappingTextBoxFlag xmlns="" xmlns:m="http://schemas.openxmlformats.org/officeDocument/2006/math" xmlns:a14="http://schemas.microsoft.com/office/drawing/2010/main" xmlns:ma14="http://schemas.microsoft.com/office/mac/drawingml/2011/main" val="1"/>
+              <ma14:wrappingTextBoxFlag xmlns:ma14="http://schemas.microsoft.com/office/mac/drawingml/2011/main" xmlns:a14="http://schemas.microsoft.com/office/drawing/2010/main" xmlns:m="http://schemas.openxmlformats.org/officeDocument/2006/math" xmlns="" val="1"/>
             </a:ext>
           </a:extLst>
         </p:spPr>
@@ -5589,7 +5597,7 @@
         <p:push dir="u"/>
       </p:transition>
     </mc:Choice>
-    <mc:Fallback xmlns="" xmlns:m="http://schemas.openxmlformats.org/officeDocument/2006/math" xmlns:a14="http://schemas.microsoft.com/office/drawing/2010/main">
+    <mc:Fallback xmlns:a14="http://schemas.microsoft.com/office/drawing/2010/main" xmlns:m="http://schemas.openxmlformats.org/officeDocument/2006/math" xmlns="">
       <p:transition spd="slow">
         <p:fade/>
       </p:transition>
@@ -5710,7 +5718,7 @@
           </a:ln>
           <a:extLst>
             <a:ext uri="{C572A759-6A51-4108-AA02-DFA0A04FC94B}">
-              <ma14:wrappingTextBoxFlag xmlns="" xmlns:m="http://schemas.openxmlformats.org/officeDocument/2006/math" xmlns:a14="http://schemas.microsoft.com/office/drawing/2010/main" xmlns:ma14="http://schemas.microsoft.com/office/mac/drawingml/2011/main" val="1"/>
+              <ma14:wrappingTextBoxFlag xmlns:ma14="http://schemas.microsoft.com/office/mac/drawingml/2011/main" xmlns:a14="http://schemas.microsoft.com/office/drawing/2010/main" xmlns:m="http://schemas.openxmlformats.org/officeDocument/2006/math" xmlns="" val="1"/>
             </a:ext>
           </a:extLst>
         </p:spPr>
@@ -5746,7 +5754,7 @@
           </a:prstGeom>
           <a:extLst>
             <a:ext uri="{C572A759-6A51-4108-AA02-DFA0A04FC94B}">
-              <ma14:wrappingTextBoxFlag xmlns="" xmlns:m="http://schemas.openxmlformats.org/officeDocument/2006/math" xmlns:a14="http://schemas.microsoft.com/office/drawing/2010/main" xmlns:ma14="http://schemas.microsoft.com/office/mac/drawingml/2011/main" val="1"/>
+              <ma14:wrappingTextBoxFlag xmlns:ma14="http://schemas.microsoft.com/office/mac/drawingml/2011/main" xmlns:a14="http://schemas.microsoft.com/office/drawing/2010/main" xmlns:m="http://schemas.openxmlformats.org/officeDocument/2006/math" xmlns="" val="1"/>
             </a:ext>
           </a:extLst>
         </p:spPr>
@@ -5773,7 +5781,7 @@
         <p:push dir="u"/>
       </p:transition>
     </mc:Choice>
-    <mc:Fallback xmlns="" xmlns:m="http://schemas.openxmlformats.org/officeDocument/2006/math" xmlns:a14="http://schemas.microsoft.com/office/drawing/2010/main">
+    <mc:Fallback xmlns:a14="http://schemas.microsoft.com/office/drawing/2010/main" xmlns:m="http://schemas.openxmlformats.org/officeDocument/2006/math" xmlns="">
       <p:transition spd="slow">
         <p:fade/>
       </p:transition>
@@ -5886,7 +5894,7 @@
           </a:ln>
           <a:extLst>
             <a:ext uri="{C572A759-6A51-4108-AA02-DFA0A04FC94B}">
-              <ma14:wrappingTextBoxFlag xmlns="" xmlns:m="http://schemas.openxmlformats.org/officeDocument/2006/math" xmlns:a14="http://schemas.microsoft.com/office/drawing/2010/main" xmlns:ma14="http://schemas.microsoft.com/office/mac/drawingml/2011/main" val="1"/>
+              <ma14:wrappingTextBoxFlag xmlns:ma14="http://schemas.microsoft.com/office/mac/drawingml/2011/main" xmlns:a14="http://schemas.microsoft.com/office/drawing/2010/main" xmlns:m="http://schemas.openxmlformats.org/officeDocument/2006/math" xmlns="" val="1"/>
             </a:ext>
           </a:extLst>
         </p:spPr>
@@ -5922,7 +5930,7 @@
           </a:prstGeom>
           <a:extLst>
             <a:ext uri="{C572A759-6A51-4108-AA02-DFA0A04FC94B}">
-              <ma14:wrappingTextBoxFlag xmlns="" xmlns:m="http://schemas.openxmlformats.org/officeDocument/2006/math" xmlns:a14="http://schemas.microsoft.com/office/drawing/2010/main" xmlns:ma14="http://schemas.microsoft.com/office/mac/drawingml/2011/main" val="1"/>
+              <ma14:wrappingTextBoxFlag xmlns:ma14="http://schemas.microsoft.com/office/mac/drawingml/2011/main" xmlns:a14="http://schemas.microsoft.com/office/drawing/2010/main" xmlns:m="http://schemas.openxmlformats.org/officeDocument/2006/math" xmlns="" val="1"/>
             </a:ext>
           </a:extLst>
         </p:spPr>

</xml_diff>

<commit_message>
added CE and PP slides along with context on each that will be replaced
</commit_message>
<xml_diff>
--- a/Development-Training_Name/4-Implement/Lesson_Plans-POI_NAME/Lesson_Plan01-NAME/Audio_Visual-Template/Lesson_Slide-LESSON_NAME.pptx
+++ b/Development-Training_Name/4-Implement/Lesson_Plans-POI_NAME/Lesson_Plan01-NAME/Audio_Visual-Template/Lesson_Slide-LESSON_NAME.pptx
@@ -6,16 +6,18 @@
     <p:sldMasterId id="2147483675" r:id="rId2"/>
   </p:sldMasterIdLst>
   <p:notesMasterIdLst>
-    <p:notesMasterId r:id="rId10"/>
+    <p:notesMasterId r:id="rId12"/>
   </p:notesMasterIdLst>
   <p:sldIdLst>
     <p:sldId id="620" r:id="rId3"/>
-    <p:sldId id="621" r:id="rId4"/>
-    <p:sldId id="383" r:id="rId5"/>
-    <p:sldId id="269" r:id="rId6"/>
-    <p:sldId id="270" r:id="rId7"/>
-    <p:sldId id="271" r:id="rId8"/>
-    <p:sldId id="272" r:id="rId9"/>
+    <p:sldId id="383" r:id="rId4"/>
+    <p:sldId id="621" r:id="rId5"/>
+    <p:sldId id="623" r:id="rId6"/>
+    <p:sldId id="622" r:id="rId7"/>
+    <p:sldId id="269" r:id="rId8"/>
+    <p:sldId id="270" r:id="rId9"/>
+    <p:sldId id="271" r:id="rId10"/>
+    <p:sldId id="272" r:id="rId11"/>
   </p:sldIdLst>
   <p:sldSz cx="12192000" cy="6858000"/>
   <p:notesSz cx="6858000" cy="9144000"/>
@@ -750,7 +752,7 @@
                 </a:solidFill>
                 <a:latin typeface="Times New Roman"/>
               </a:rPr>
-              <a:t>2</a:t>
+              <a:t>3</a:t>
             </a:fld>
             <a:endParaRPr lang="en-US" sz="1400" b="0" strike="noStrike" spc="-1">
               <a:solidFill>
@@ -4922,7 +4924,7 @@
         </p:nvSpPr>
         <p:spPr>
           <a:xfrm>
-            <a:off x="349035" y="2817753"/>
+            <a:off x="375127" y="748695"/>
             <a:ext cx="11441743" cy="2020339"/>
           </a:xfrm>
         </p:spPr>
@@ -5015,7 +5017,7 @@
           </a:ln>
           <a:extLst>
             <a:ext uri="{C572A759-6A51-4108-AA02-DFA0A04FC94B}">
-              <ma14:wrappingTextBoxFlag xmlns:ma14="http://schemas.microsoft.com/office/mac/drawingml/2011/main" xmlns:a14="http://schemas.microsoft.com/office/drawing/2010/main" xmlns:m="http://schemas.openxmlformats.org/officeDocument/2006/math" xmlns="" val="1"/>
+              <ma14:wrappingTextBoxFlag xmlns="" xmlns:m="http://schemas.openxmlformats.org/officeDocument/2006/math" xmlns:a14="http://schemas.microsoft.com/office/drawing/2010/main" xmlns:ma14="http://schemas.microsoft.com/office/mac/drawingml/2011/main" val="1"/>
             </a:ext>
           </a:extLst>
         </p:spPr>
@@ -5062,7 +5064,7 @@
           </a:ln>
           <a:extLst>
             <a:ext uri="{C572A759-6A51-4108-AA02-DFA0A04FC94B}">
-              <ma14:wrappingTextBoxFlag xmlns:ma14="http://schemas.microsoft.com/office/mac/drawingml/2011/main" xmlns:a14="http://schemas.microsoft.com/office/drawing/2010/main" xmlns:m="http://schemas.openxmlformats.org/officeDocument/2006/math" xmlns="" val="1"/>
+              <ma14:wrappingTextBoxFlag xmlns="" xmlns:m="http://schemas.openxmlformats.org/officeDocument/2006/math" xmlns:a14="http://schemas.microsoft.com/office/drawing/2010/main" xmlns:ma14="http://schemas.microsoft.com/office/mac/drawingml/2011/main" val="1"/>
             </a:ext>
           </a:extLst>
         </p:spPr>
@@ -5109,7 +5111,7 @@
           </a:ln>
           <a:extLst>
             <a:ext uri="{C572A759-6A51-4108-AA02-DFA0A04FC94B}">
-              <ma14:wrappingTextBoxFlag xmlns:ma14="http://schemas.microsoft.com/office/mac/drawingml/2011/main" xmlns:a14="http://schemas.microsoft.com/office/drawing/2010/main" xmlns:m="http://schemas.openxmlformats.org/officeDocument/2006/math" xmlns="" val="1"/>
+              <ma14:wrappingTextBoxFlag xmlns="" xmlns:m="http://schemas.openxmlformats.org/officeDocument/2006/math" xmlns:a14="http://schemas.microsoft.com/office/drawing/2010/main" xmlns:ma14="http://schemas.microsoft.com/office/mac/drawingml/2011/main" val="1"/>
             </a:ext>
           </a:extLst>
         </p:spPr>
@@ -5156,7 +5158,7 @@
           </a:ln>
           <a:extLst>
             <a:ext uri="{C572A759-6A51-4108-AA02-DFA0A04FC94B}">
-              <ma14:wrappingTextBoxFlag xmlns:ma14="http://schemas.microsoft.com/office/mac/drawingml/2011/main" xmlns:a14="http://schemas.microsoft.com/office/drawing/2010/main" xmlns:m="http://schemas.openxmlformats.org/officeDocument/2006/math" xmlns="" val="1"/>
+              <ma14:wrappingTextBoxFlag xmlns="" xmlns:m="http://schemas.openxmlformats.org/officeDocument/2006/math" xmlns:a14="http://schemas.microsoft.com/office/drawing/2010/main" xmlns:ma14="http://schemas.microsoft.com/office/mac/drawingml/2011/main" val="1"/>
             </a:ext>
           </a:extLst>
         </p:spPr>
@@ -5206,72 +5208,94 @@
       </p:grpSpPr>
       <p:sp>
         <p:nvSpPr>
-          <p:cNvPr id="2" name="Content Placeholder 1">
-            <a:extLst>
-              <a:ext uri="{FF2B5EF4-FFF2-40B4-BE49-F238E27FC236}">
-                <a16:creationId xmlns:a16="http://schemas.microsoft.com/office/drawing/2014/main" id="{7C1822AB-D5F0-D579-A820-812EE3C83EDD}"/>
-              </a:ext>
-            </a:extLst>
-          </p:cNvPr>
-          <p:cNvSpPr>
-            <a:spLocks noGrp="1"/>
-          </p:cNvSpPr>
-          <p:nvPr>
-            <p:ph/>
-          </p:nvPr>
-        </p:nvSpPr>
-        <p:spPr>
-          <a:xfrm>
-            <a:off x="375127" y="2963211"/>
-            <a:ext cx="11441743" cy="1061102"/>
-          </a:xfrm>
-        </p:spPr>
-        <p:txBody>
-          <a:bodyPr/>
-          <a:lstStyle/>
-          <a:p>
-            <a:pPr marL="0" indent="0" algn="ctr">
+          <p:cNvPr id="2" name="Title 1">
+            <a:extLst>
+              <a:ext uri="{FF2B5EF4-FFF2-40B4-BE49-F238E27FC236}">
+                <a16:creationId xmlns:a16="http://schemas.microsoft.com/office/drawing/2014/main" id="{0E7CCAEB-D84E-456D-3B6B-2E9573C73F98}"/>
+              </a:ext>
+            </a:extLst>
+          </p:cNvPr>
+          <p:cNvSpPr>
+            <a:spLocks noGrp="1"/>
+          </p:cNvSpPr>
+          <p:nvPr>
+            <p:ph type="title"/>
+          </p:nvPr>
+        </p:nvSpPr>
+        <p:spPr/>
+        <p:txBody>
+          <a:bodyPr/>
+          <a:lstStyle/>
+          <a:p>
+            <a:r>
+              <a:rPr lang="en-US" dirty="0"/>
+              <a:t>Concrete Experience</a:t>
+            </a:r>
+          </a:p>
+        </p:txBody>
+      </p:sp>
+      <p:sp>
+        <p:nvSpPr>
+          <p:cNvPr id="3" name="Content Placeholder 2">
+            <a:extLst>
+              <a:ext uri="{FF2B5EF4-FFF2-40B4-BE49-F238E27FC236}">
+                <a16:creationId xmlns:a16="http://schemas.microsoft.com/office/drawing/2014/main" id="{0A5EC664-EFAD-501E-02EA-4124C835D47B}"/>
+              </a:ext>
+            </a:extLst>
+          </p:cNvPr>
+          <p:cNvSpPr>
+            <a:spLocks noGrp="1"/>
+          </p:cNvSpPr>
+          <p:nvPr>
+            <p:ph idx="1"/>
+          </p:nvPr>
+        </p:nvSpPr>
+        <p:spPr/>
+        <p:txBody>
+          <a:bodyPr/>
+          <a:lstStyle/>
+          <a:p>
+            <a:r>
+              <a:rPr lang="en-US" dirty="0"/>
+              <a:t>Blurs</a:t>
+            </a:r>
+          </a:p>
+          <a:p>
+            <a:r>
+              <a:rPr lang="en-US" dirty="0"/>
+              <a:t>Video</a:t>
+            </a:r>
+          </a:p>
+          <a:p>
+            <a:r>
+              <a:rPr lang="en-US" dirty="0"/>
+              <a:t>Image</a:t>
+            </a:r>
+          </a:p>
+          <a:p>
+            <a:r>
+              <a:rPr lang="en-US" dirty="0"/>
+              <a:t>Instructions</a:t>
+            </a:r>
+          </a:p>
+          <a:p>
+            <a:endParaRPr lang="en-US" dirty="0"/>
+          </a:p>
+          <a:p>
+            <a:pPr marL="0" indent="0">
               <a:buNone/>
             </a:pPr>
             <a:r>
-              <a:rPr lang="en-US" sz="6000" dirty="0">
-                <a:latin typeface="Arial" panose="020B0604020202020204" pitchFamily="34" charset="0"/>
-                <a:cs typeface="Arial" panose="020B0604020202020204" pitchFamily="34" charset="0"/>
-              </a:rPr>
-              <a:t>{Lesson}</a:t>
-            </a:r>
-          </a:p>
-        </p:txBody>
-      </p:sp>
-      <p:sp>
-        <p:nvSpPr>
-          <p:cNvPr id="3" name="Text Placeholder 2">
-            <a:extLst>
-              <a:ext uri="{FF2B5EF4-FFF2-40B4-BE49-F238E27FC236}">
-                <a16:creationId xmlns:a16="http://schemas.microsoft.com/office/drawing/2014/main" id="{D94C7E47-63B7-8E9D-6345-B12B99DBCE2B}"/>
-              </a:ext>
-            </a:extLst>
-          </p:cNvPr>
-          <p:cNvSpPr>
-            <a:spLocks noGrp="1"/>
-          </p:cNvSpPr>
-          <p:nvPr>
-            <p:ph type="body" sz="quarter" idx="10"/>
-          </p:nvPr>
-        </p:nvSpPr>
-        <p:spPr/>
-        <p:txBody>
-          <a:bodyPr/>
-          <a:lstStyle/>
-          <a:p>
-            <a:endParaRPr lang="en-US"/>
+              <a:rPr lang="en-US" dirty="0"/>
+              <a:t>This is not just for getting the student’s attention but for bringing adjacent skills to the surface or for presenting a challenge which the lesson will solve. If presented in this way, the student will be bought into the lesson.</a:t>
+            </a:r>
           </a:p>
         </p:txBody>
       </p:sp>
     </p:spTree>
     <p:extLst>
       <p:ext uri="{BB962C8B-B14F-4D97-AF65-F5344CB8AC3E}">
-        <p14:creationId xmlns:p14="http://schemas.microsoft.com/office/powerpoint/2010/main" val="2329516533"/>
+        <p14:creationId xmlns:p14="http://schemas.microsoft.com/office/powerpoint/2010/main" val="2792640674"/>
       </p:ext>
     </p:extLst>
   </p:cSld>
@@ -5300,43 +5324,57 @@
       </p:grpSpPr>
       <p:sp>
         <p:nvSpPr>
-          <p:cNvPr id="2" name="Title 1">
-            <a:extLst>
-              <a:ext uri="{FF2B5EF4-FFF2-40B4-BE49-F238E27FC236}">
-                <a16:creationId xmlns:a16="http://schemas.microsoft.com/office/drawing/2014/main" id="{0E7CCAEB-D84E-456D-3B6B-2E9573C73F98}"/>
-              </a:ext>
-            </a:extLst>
-          </p:cNvPr>
-          <p:cNvSpPr>
-            <a:spLocks noGrp="1"/>
-          </p:cNvSpPr>
-          <p:nvPr>
-            <p:ph type="title"/>
-          </p:nvPr>
-        </p:nvSpPr>
-        <p:spPr/>
-        <p:txBody>
-          <a:bodyPr/>
-          <a:lstStyle/>
-          <a:p>
-            <a:endParaRPr lang="en-US"/>
-          </a:p>
-        </p:txBody>
-      </p:sp>
-      <p:sp>
-        <p:nvSpPr>
-          <p:cNvPr id="3" name="Content Placeholder 2">
-            <a:extLst>
-              <a:ext uri="{FF2B5EF4-FFF2-40B4-BE49-F238E27FC236}">
-                <a16:creationId xmlns:a16="http://schemas.microsoft.com/office/drawing/2014/main" id="{0A5EC664-EFAD-501E-02EA-4124C835D47B}"/>
-              </a:ext>
-            </a:extLst>
-          </p:cNvPr>
-          <p:cNvSpPr>
-            <a:spLocks noGrp="1"/>
-          </p:cNvSpPr>
-          <p:nvPr>
-            <p:ph idx="1"/>
+          <p:cNvPr id="2" name="Content Placeholder 1">
+            <a:extLst>
+              <a:ext uri="{FF2B5EF4-FFF2-40B4-BE49-F238E27FC236}">
+                <a16:creationId xmlns:a16="http://schemas.microsoft.com/office/drawing/2014/main" id="{7C1822AB-D5F0-D579-A820-812EE3C83EDD}"/>
+              </a:ext>
+            </a:extLst>
+          </p:cNvPr>
+          <p:cNvSpPr>
+            <a:spLocks noGrp="1"/>
+          </p:cNvSpPr>
+          <p:nvPr>
+            <p:ph/>
+          </p:nvPr>
+        </p:nvSpPr>
+        <p:spPr>
+          <a:xfrm>
+            <a:off x="375127" y="2963211"/>
+            <a:ext cx="11441743" cy="1061102"/>
+          </a:xfrm>
+        </p:spPr>
+        <p:txBody>
+          <a:bodyPr/>
+          <a:lstStyle/>
+          <a:p>
+            <a:pPr marL="0" indent="0" algn="ctr">
+              <a:buNone/>
+            </a:pPr>
+            <a:r>
+              <a:rPr lang="en-US" sz="6000" dirty="0">
+                <a:latin typeface="Arial" panose="020B0604020202020204" pitchFamily="34" charset="0"/>
+                <a:cs typeface="Arial" panose="020B0604020202020204" pitchFamily="34" charset="0"/>
+              </a:rPr>
+              <a:t>{Lesson Title}</a:t>
+            </a:r>
+          </a:p>
+        </p:txBody>
+      </p:sp>
+      <p:sp>
+        <p:nvSpPr>
+          <p:cNvPr id="3" name="Text Placeholder 2">
+            <a:extLst>
+              <a:ext uri="{FF2B5EF4-FFF2-40B4-BE49-F238E27FC236}">
+                <a16:creationId xmlns:a16="http://schemas.microsoft.com/office/drawing/2014/main" id="{D94C7E47-63B7-8E9D-6345-B12B99DBCE2B}"/>
+              </a:ext>
+            </a:extLst>
+          </p:cNvPr>
+          <p:cNvSpPr>
+            <a:spLocks noGrp="1"/>
+          </p:cNvSpPr>
+          <p:nvPr>
+            <p:ph type="body" sz="quarter" idx="10"/>
           </p:nvPr>
         </p:nvSpPr>
         <p:spPr/>
@@ -5351,7 +5389,7 @@
     </p:spTree>
     <p:extLst>
       <p:ext uri="{BB962C8B-B14F-4D97-AF65-F5344CB8AC3E}">
-        <p14:creationId xmlns:p14="http://schemas.microsoft.com/office/powerpoint/2010/main" val="2792640674"/>
+        <p14:creationId xmlns:p14="http://schemas.microsoft.com/office/powerpoint/2010/main" val="2329516533"/>
       </p:ext>
     </p:extLst>
   </p:cSld>
@@ -5362,6 +5400,190 @@
 </file>
 
 <file path=ppt/slides/slide4.xml><?xml version="1.0" encoding="utf-8"?>
+<p:sld xmlns:a="http://schemas.openxmlformats.org/drawingml/2006/main" xmlns:r="http://schemas.openxmlformats.org/officeDocument/2006/relationships" xmlns:p="http://schemas.openxmlformats.org/presentationml/2006/main">
+  <p:cSld>
+    <p:spTree>
+      <p:nvGrpSpPr>
+        <p:cNvPr id="1" name=""/>
+        <p:cNvGrpSpPr/>
+        <p:nvPr/>
+      </p:nvGrpSpPr>
+      <p:grpSpPr>
+        <a:xfrm>
+          <a:off x="0" y="0"/>
+          <a:ext cx="0" cy="0"/>
+          <a:chOff x="0" y="0"/>
+          <a:chExt cx="0" cy="0"/>
+        </a:xfrm>
+      </p:grpSpPr>
+      <p:sp>
+        <p:nvSpPr>
+          <p:cNvPr id="2" name="Title 1">
+            <a:extLst>
+              <a:ext uri="{FF2B5EF4-FFF2-40B4-BE49-F238E27FC236}">
+                <a16:creationId xmlns:a16="http://schemas.microsoft.com/office/drawing/2014/main" id="{0E7CCAEB-D84E-456D-3B6B-2E9573C73F98}"/>
+              </a:ext>
+            </a:extLst>
+          </p:cNvPr>
+          <p:cNvSpPr>
+            <a:spLocks noGrp="1"/>
+          </p:cNvSpPr>
+          <p:nvPr>
+            <p:ph type="title"/>
+          </p:nvPr>
+        </p:nvSpPr>
+        <p:spPr/>
+        <p:txBody>
+          <a:bodyPr/>
+          <a:lstStyle/>
+          <a:p>
+            <a:r>
+              <a:rPr lang="en-US" dirty="0"/>
+              <a:t>Publish and Process</a:t>
+            </a:r>
+          </a:p>
+        </p:txBody>
+      </p:sp>
+      <p:sp>
+        <p:nvSpPr>
+          <p:cNvPr id="3" name="Content Placeholder 2">
+            <a:extLst>
+              <a:ext uri="{FF2B5EF4-FFF2-40B4-BE49-F238E27FC236}">
+                <a16:creationId xmlns:a16="http://schemas.microsoft.com/office/drawing/2014/main" id="{0A5EC664-EFAD-501E-02EA-4124C835D47B}"/>
+              </a:ext>
+            </a:extLst>
+          </p:cNvPr>
+          <p:cNvSpPr>
+            <a:spLocks noGrp="1"/>
+          </p:cNvSpPr>
+          <p:nvPr>
+            <p:ph idx="1"/>
+          </p:nvPr>
+        </p:nvSpPr>
+        <p:spPr/>
+        <p:txBody>
+          <a:bodyPr/>
+          <a:lstStyle/>
+          <a:p>
+            <a:r>
+              <a:rPr lang="en-US" dirty="0"/>
+              <a:t>Task that this lesson will focus on</a:t>
+            </a:r>
+          </a:p>
+          <a:p>
+            <a:r>
+              <a:rPr lang="en-US" dirty="0"/>
+              <a:t>Conditions what students will have access to</a:t>
+            </a:r>
+          </a:p>
+          <a:p>
+            <a:r>
+              <a:rPr lang="en-US" dirty="0"/>
+              <a:t>Standards it may be preferred to copy and paste the actual standard blurb but ideally you should write to your audience receiving the training. Something like, By the end of this lesson you will …. “XYZ”</a:t>
+            </a:r>
+          </a:p>
+          <a:p>
+            <a:endParaRPr lang="en-US" dirty="0"/>
+          </a:p>
+        </p:txBody>
+      </p:sp>
+    </p:spTree>
+    <p:extLst>
+      <p:ext uri="{BB962C8B-B14F-4D97-AF65-F5344CB8AC3E}">
+        <p14:creationId xmlns:p14="http://schemas.microsoft.com/office/powerpoint/2010/main" val="3223093895"/>
+      </p:ext>
+    </p:extLst>
+  </p:cSld>
+  <p:clrMapOvr>
+    <a:masterClrMapping/>
+  </p:clrMapOvr>
+</p:sld>
+</file>
+
+<file path=ppt/slides/slide5.xml><?xml version="1.0" encoding="utf-8"?>
+<p:sld xmlns:a="http://schemas.openxmlformats.org/drawingml/2006/main" xmlns:r="http://schemas.openxmlformats.org/officeDocument/2006/relationships" xmlns:p="http://schemas.openxmlformats.org/presentationml/2006/main">
+  <p:cSld>
+    <p:spTree>
+      <p:nvGrpSpPr>
+        <p:cNvPr id="1" name=""/>
+        <p:cNvGrpSpPr/>
+        <p:nvPr/>
+      </p:nvGrpSpPr>
+      <p:grpSpPr>
+        <a:xfrm>
+          <a:off x="0" y="0"/>
+          <a:ext cx="0" cy="0"/>
+          <a:chOff x="0" y="0"/>
+          <a:chExt cx="0" cy="0"/>
+        </a:xfrm>
+      </p:grpSpPr>
+      <p:sp>
+        <p:nvSpPr>
+          <p:cNvPr id="2" name="Title 1">
+            <a:extLst>
+              <a:ext uri="{FF2B5EF4-FFF2-40B4-BE49-F238E27FC236}">
+                <a16:creationId xmlns:a16="http://schemas.microsoft.com/office/drawing/2014/main" id="{0E7CCAEB-D84E-456D-3B6B-2E9573C73F98}"/>
+              </a:ext>
+            </a:extLst>
+          </p:cNvPr>
+          <p:cNvSpPr>
+            <a:spLocks noGrp="1"/>
+          </p:cNvSpPr>
+          <p:nvPr>
+            <p:ph type="title"/>
+          </p:nvPr>
+        </p:nvSpPr>
+        <p:spPr/>
+        <p:txBody>
+          <a:bodyPr/>
+          <a:lstStyle/>
+          <a:p>
+            <a:r>
+              <a:rPr lang="en-US" dirty="0"/>
+              <a:t>Generalize New Information</a:t>
+            </a:r>
+          </a:p>
+        </p:txBody>
+      </p:sp>
+      <p:sp>
+        <p:nvSpPr>
+          <p:cNvPr id="3" name="Content Placeholder 2">
+            <a:extLst>
+              <a:ext uri="{FF2B5EF4-FFF2-40B4-BE49-F238E27FC236}">
+                <a16:creationId xmlns:a16="http://schemas.microsoft.com/office/drawing/2014/main" id="{0A5EC664-EFAD-501E-02EA-4124C835D47B}"/>
+              </a:ext>
+            </a:extLst>
+          </p:cNvPr>
+          <p:cNvSpPr>
+            <a:spLocks noGrp="1"/>
+          </p:cNvSpPr>
+          <p:nvPr>
+            <p:ph idx="1"/>
+          </p:nvPr>
+        </p:nvSpPr>
+        <p:spPr/>
+        <p:txBody>
+          <a:bodyPr/>
+          <a:lstStyle/>
+          <a:p>
+            <a:endParaRPr lang="en-US"/>
+          </a:p>
+        </p:txBody>
+      </p:sp>
+    </p:spTree>
+    <p:extLst>
+      <p:ext uri="{BB962C8B-B14F-4D97-AF65-F5344CB8AC3E}">
+        <p14:creationId xmlns:p14="http://schemas.microsoft.com/office/powerpoint/2010/main" val="1227413418"/>
+      </p:ext>
+    </p:extLst>
+  </p:cSld>
+  <p:clrMapOvr>
+    <a:masterClrMapping/>
+  </p:clrMapOvr>
+</p:sld>
+</file>
+
+<file path=ppt/slides/slide6.xml><?xml version="1.0" encoding="utf-8"?>
 <p:sld xmlns:a="http://schemas.openxmlformats.org/drawingml/2006/main" xmlns:r="http://schemas.openxmlformats.org/officeDocument/2006/relationships" xmlns:p="http://schemas.openxmlformats.org/presentationml/2006/main">
   <p:cSld>
     <p:bg>
@@ -5458,7 +5680,7 @@
           </a:prstGeom>
           <a:extLst>
             <a:ext uri="{C572A759-6A51-4108-AA02-DFA0A04FC94B}">
-              <ma14:wrappingTextBoxFlag xmlns:ma14="http://schemas.microsoft.com/office/mac/drawingml/2011/main" xmlns:a14="http://schemas.microsoft.com/office/drawing/2010/main" xmlns:m="http://schemas.openxmlformats.org/officeDocument/2006/math" xmlns="" val="1"/>
+              <ma14:wrappingTextBoxFlag xmlns="" xmlns:m="http://schemas.openxmlformats.org/officeDocument/2006/math" xmlns:a14="http://schemas.microsoft.com/office/drawing/2010/main" xmlns:ma14="http://schemas.microsoft.com/office/mac/drawingml/2011/main" val="1"/>
             </a:ext>
           </a:extLst>
         </p:spPr>
@@ -5467,7 +5689,7 @@
           <a:lstStyle/>
           <a:p>
             <a:fld id="{86CB4B4D-7CA3-9044-876B-883B54F8677D}" type="slidenum">
-              <a:t>4</a:t>
+              <a:t>6</a:t>
             </a:fld>
             <a:endParaRPr/>
           </a:p>
@@ -5482,7 +5704,7 @@
 </p:sld>
 </file>
 
-<file path=ppt/slides/slide5.xml><?xml version="1.0" encoding="utf-8"?>
+<file path=ppt/slides/slide7.xml><?xml version="1.0" encoding="utf-8"?>
 <p:sld xmlns:a="http://schemas.openxmlformats.org/drawingml/2006/main" xmlns:r="http://schemas.openxmlformats.org/officeDocument/2006/relationships" xmlns:p="http://schemas.openxmlformats.org/presentationml/2006/main">
   <p:cSld>
     <p:spTree>
@@ -5571,7 +5793,7 @@
           </a:prstGeom>
           <a:extLst>
             <a:ext uri="{C572A759-6A51-4108-AA02-DFA0A04FC94B}">
-              <ma14:wrappingTextBoxFlag xmlns:ma14="http://schemas.microsoft.com/office/mac/drawingml/2011/main" xmlns:a14="http://schemas.microsoft.com/office/drawing/2010/main" xmlns:m="http://schemas.openxmlformats.org/officeDocument/2006/math" xmlns="" val="1"/>
+              <ma14:wrappingTextBoxFlag xmlns="" xmlns:m="http://schemas.openxmlformats.org/officeDocument/2006/math" xmlns:a14="http://schemas.microsoft.com/office/drawing/2010/main" xmlns:ma14="http://schemas.microsoft.com/office/mac/drawingml/2011/main" val="1"/>
             </a:ext>
           </a:extLst>
         </p:spPr>
@@ -5580,7 +5802,7 @@
           <a:lstStyle/>
           <a:p>
             <a:fld id="{86CB4B4D-7CA3-9044-876B-883B54F8677D}" type="slidenum">
-              <a:t>5</a:t>
+              <a:t>7</a:t>
             </a:fld>
             <a:endParaRPr/>
           </a:p>
@@ -5597,7 +5819,7 @@
         <p:push dir="u"/>
       </p:transition>
     </mc:Choice>
-    <mc:Fallback xmlns:a14="http://schemas.microsoft.com/office/drawing/2010/main" xmlns:m="http://schemas.openxmlformats.org/officeDocument/2006/math" xmlns="">
+    <mc:Fallback xmlns="" xmlns:m="http://schemas.openxmlformats.org/officeDocument/2006/math" xmlns:a14="http://schemas.microsoft.com/office/drawing/2010/main">
       <p:transition spd="slow">
         <p:fade/>
       </p:transition>
@@ -5606,7 +5828,7 @@
 </p:sld>
 </file>
 
-<file path=ppt/slides/slide6.xml><?xml version="1.0" encoding="utf-8"?>
+<file path=ppt/slides/slide8.xml><?xml version="1.0" encoding="utf-8"?>
 <p:sld xmlns:a="http://schemas.openxmlformats.org/drawingml/2006/main" xmlns:r="http://schemas.openxmlformats.org/officeDocument/2006/relationships" xmlns:p="http://schemas.openxmlformats.org/presentationml/2006/main">
   <p:cSld>
     <p:bg>
@@ -5718,7 +5940,7 @@
           </a:ln>
           <a:extLst>
             <a:ext uri="{C572A759-6A51-4108-AA02-DFA0A04FC94B}">
-              <ma14:wrappingTextBoxFlag xmlns:ma14="http://schemas.microsoft.com/office/mac/drawingml/2011/main" xmlns:a14="http://schemas.microsoft.com/office/drawing/2010/main" xmlns:m="http://schemas.openxmlformats.org/officeDocument/2006/math" xmlns="" val="1"/>
+              <ma14:wrappingTextBoxFlag xmlns="" xmlns:m="http://schemas.openxmlformats.org/officeDocument/2006/math" xmlns:a14="http://schemas.microsoft.com/office/drawing/2010/main" xmlns:ma14="http://schemas.microsoft.com/office/mac/drawingml/2011/main" val="1"/>
             </a:ext>
           </a:extLst>
         </p:spPr>
@@ -5754,7 +5976,7 @@
           </a:prstGeom>
           <a:extLst>
             <a:ext uri="{C572A759-6A51-4108-AA02-DFA0A04FC94B}">
-              <ma14:wrappingTextBoxFlag xmlns:ma14="http://schemas.microsoft.com/office/mac/drawingml/2011/main" xmlns:a14="http://schemas.microsoft.com/office/drawing/2010/main" xmlns:m="http://schemas.openxmlformats.org/officeDocument/2006/math" xmlns="" val="1"/>
+              <ma14:wrappingTextBoxFlag xmlns="" xmlns:m="http://schemas.openxmlformats.org/officeDocument/2006/math" xmlns:a14="http://schemas.microsoft.com/office/drawing/2010/main" xmlns:ma14="http://schemas.microsoft.com/office/mac/drawingml/2011/main" val="1"/>
             </a:ext>
           </a:extLst>
         </p:spPr>
@@ -5764,7 +5986,7 @@
           <a:p>
             <a:fld id="{86CB4B4D-7CA3-9044-876B-883B54F8677D}" type="slidenum">
               <a:rPr/>
-              <a:t>6</a:t>
+              <a:t>8</a:t>
             </a:fld>
             <a:endParaRPr/>
           </a:p>
@@ -5781,7 +6003,7 @@
         <p:push dir="u"/>
       </p:transition>
     </mc:Choice>
-    <mc:Fallback xmlns:a14="http://schemas.microsoft.com/office/drawing/2010/main" xmlns:m="http://schemas.openxmlformats.org/officeDocument/2006/math" xmlns="">
+    <mc:Fallback xmlns="" xmlns:m="http://schemas.openxmlformats.org/officeDocument/2006/math" xmlns:a14="http://schemas.microsoft.com/office/drawing/2010/main">
       <p:transition spd="slow">
         <p:fade/>
       </p:transition>
@@ -5790,7 +6012,7 @@
 </p:sld>
 </file>
 
-<file path=ppt/slides/slide7.xml><?xml version="1.0" encoding="utf-8"?>
+<file path=ppt/slides/slide9.xml><?xml version="1.0" encoding="utf-8"?>
 <p:sld xmlns:a="http://schemas.openxmlformats.org/drawingml/2006/main" xmlns:r="http://schemas.openxmlformats.org/officeDocument/2006/relationships" xmlns:p="http://schemas.openxmlformats.org/presentationml/2006/main">
   <p:cSld>
     <p:spTree>
@@ -5894,7 +6116,7 @@
           </a:ln>
           <a:extLst>
             <a:ext uri="{C572A759-6A51-4108-AA02-DFA0A04FC94B}">
-              <ma14:wrappingTextBoxFlag xmlns:ma14="http://schemas.microsoft.com/office/mac/drawingml/2011/main" xmlns:a14="http://schemas.microsoft.com/office/drawing/2010/main" xmlns:m="http://schemas.openxmlformats.org/officeDocument/2006/math" xmlns="" val="1"/>
+              <ma14:wrappingTextBoxFlag xmlns="" xmlns:m="http://schemas.openxmlformats.org/officeDocument/2006/math" xmlns:a14="http://schemas.microsoft.com/office/drawing/2010/main" xmlns:ma14="http://schemas.microsoft.com/office/mac/drawingml/2011/main" val="1"/>
             </a:ext>
           </a:extLst>
         </p:spPr>
@@ -5930,7 +6152,7 @@
           </a:prstGeom>
           <a:extLst>
             <a:ext uri="{C572A759-6A51-4108-AA02-DFA0A04FC94B}">
-              <ma14:wrappingTextBoxFlag xmlns:ma14="http://schemas.microsoft.com/office/mac/drawingml/2011/main" xmlns:a14="http://schemas.microsoft.com/office/drawing/2010/main" xmlns:m="http://schemas.openxmlformats.org/officeDocument/2006/math" xmlns="" val="1"/>
+              <ma14:wrappingTextBoxFlag xmlns="" xmlns:m="http://schemas.openxmlformats.org/officeDocument/2006/math" xmlns:a14="http://schemas.microsoft.com/office/drawing/2010/main" xmlns:ma14="http://schemas.microsoft.com/office/mac/drawingml/2011/main" val="1"/>
             </a:ext>
           </a:extLst>
         </p:spPr>
@@ -5939,7 +6161,7 @@
           <a:lstStyle/>
           <a:p>
             <a:fld id="{86CB4B4D-7CA3-9044-876B-883B54F8677D}" type="slidenum">
-              <a:t>7</a:t>
+              <a:t>9</a:t>
             </a:fld>
             <a:endParaRPr/>
           </a:p>

</xml_diff>